<commit_message>
Updating for root note control
</commit_message>
<xml_diff>
--- a/FlexArp Instructions.pptx
+++ b/FlexArp Instructions.pptx
@@ -4728,7 +4728,7 @@
         </p:nvSpPr>
         <p:spPr>
           <a:xfrm>
-            <a:off x="4152486" y="544260"/>
+            <a:off x="4152486" y="478566"/>
             <a:ext cx="5558756" cy="2673555"/>
           </a:xfrm>
           <a:prstGeom prst="rect">
@@ -4738,14 +4738,45 @@
         </p:spPr>
         <p:txBody>
           <a:bodyPr wrap="square" rtlCol="0">
-            <a:normAutofit fontScale="92500" lnSpcReduction="20000"/>
+            <a:normAutofit fontScale="70000" lnSpcReduction="20000"/>
           </a:bodyPr>
           <a:lstStyle/>
           <a:p>
             <a:r>
+              <a:rPr lang="en-US" sz="1100" dirty="0" smtClean="0"/>
+              <a:t>The </a:t>
+            </a:r>
+            <a:r>
+              <a:rPr lang="en-US" sz="1100" dirty="0" err="1" smtClean="0"/>
+              <a:t>arpeggiator</a:t>
+            </a:r>
+            <a:r>
+              <a:rPr lang="en-US" sz="1100" dirty="0" smtClean="0"/>
+              <a:t> will play 5 octaves of notes. If an </a:t>
+            </a:r>
+            <a:r>
+              <a:rPr lang="en-US" sz="1100" dirty="0" err="1" smtClean="0"/>
+              <a:t>apreggio</a:t>
+            </a:r>
+            <a:r>
+              <a:rPr lang="en-US" sz="1100" dirty="0"/>
+              <a:t> </a:t>
+            </a:r>
+            <a:r>
+              <a:rPr lang="en-US" sz="1100" dirty="0" smtClean="0"/>
+              <a:t>tries to play above this, we drop the remainder of it 5 octaves, then continue to play from that level.</a:t>
+            </a:r>
+            <a:endParaRPr lang="en-US" sz="1100" dirty="0" smtClean="0"/>
+          </a:p>
+          <a:p>
+            <a:endParaRPr lang="en-US" sz="1100" b="1" u="sng" dirty="0"/>
+          </a:p>
+          <a:p>
+            <a:r>
               <a:rPr lang="en-US" sz="1100" b="1" u="sng" dirty="0" smtClean="0"/>
               <a:t>Outputs</a:t>
             </a:r>
+            <a:endParaRPr lang="en-US" sz="1100" b="1" u="sng" dirty="0" smtClean="0"/>
           </a:p>
           <a:p>
             <a:endParaRPr lang="en-US" sz="1100" b="1" u="sng" dirty="0"/>
@@ -4759,14 +4790,24 @@
           <a:p>
             <a:r>
               <a:rPr lang="en-US" sz="1100" dirty="0"/>
-              <a:t>D0 triggers every time the entire arpeggio sequence starts again.</a:t>
-            </a:r>
+              <a:t>D0 triggers every time the entire arpeggio sequence starts </a:t>
+            </a:r>
+            <a:r>
+              <a:rPr lang="en-US" sz="1100" dirty="0" smtClean="0"/>
+              <a:t>again</a:t>
+            </a:r>
+            <a:endParaRPr lang="en-US" sz="1100" dirty="0"/>
           </a:p>
           <a:p>
             <a:r>
               <a:rPr lang="en-US" sz="1100" dirty="0"/>
-              <a:t>D1 triggers every time the arpeggio changes octave.</a:t>
-            </a:r>
+              <a:t>D1 triggers every time the arpeggio changes octave</a:t>
+            </a:r>
+            <a:r>
+              <a:rPr lang="en-US" sz="1100" dirty="0" smtClean="0"/>
+              <a:t>.</a:t>
+            </a:r>
+            <a:endParaRPr lang="en-US" sz="1100" dirty="0"/>
           </a:p>
           <a:p>
             <a:endParaRPr lang="en-US" sz="1100" b="1" u="sng" dirty="0" smtClean="0"/>
@@ -4792,7 +4833,15 @@
           <a:p>
             <a:r>
               <a:rPr lang="en-US" sz="1100" dirty="0" smtClean="0"/>
-              <a:t>To enter Control Mode, turn the A3 control all the way up.</a:t>
+              <a:t>To enter Control Mode, turn the </a:t>
+            </a:r>
+            <a:r>
+              <a:rPr lang="en-US" sz="1100" dirty="0" smtClean="0"/>
+              <a:t>A2 and A3 controls </a:t>
+            </a:r>
+            <a:r>
+              <a:rPr lang="en-US" sz="1100" dirty="0" smtClean="0"/>
+              <a:t>all the way up.</a:t>
             </a:r>
           </a:p>
           <a:p>
@@ -4819,7 +4868,23 @@
           <a:p>
             <a:r>
               <a:rPr lang="en-US" sz="1100" dirty="0" smtClean="0"/>
-              <a:t>You can also enter this mode on the fly using CV to achieve some extensive variations, switching between modes using a CV source. The same CV source will then influence different parameters once control mode is exited (which again, you would do by changing the appropriate CV). Some pretty complex automation of this can be achieved using </a:t>
+              <a:t>You can also enter this mode on the fly using </a:t>
+            </a:r>
+            <a:r>
+              <a:rPr lang="en-US" sz="1100" dirty="0" smtClean="0"/>
+              <a:t>CV, then switch </a:t>
+            </a:r>
+            <a:r>
+              <a:rPr lang="en-US" sz="1100" dirty="0" smtClean="0"/>
+              <a:t>between </a:t>
+            </a:r>
+            <a:r>
+              <a:rPr lang="en-US" sz="1100" dirty="0" smtClean="0"/>
+              <a:t>layouts using </a:t>
+            </a:r>
+            <a:r>
+              <a:rPr lang="en-US" sz="1100" dirty="0" smtClean="0"/>
+              <a:t>a CV source. The same CV source will then influence different parameters once control mode is exited (which again, you would do by changing the appropriate CV). Some pretty complex automation of this can be achieved using </a:t>
             </a:r>
             <a:r>
               <a:rPr lang="en-US" sz="1100" dirty="0"/>
@@ -4827,7 +4892,11 @@
             </a:r>
             <a:r>
               <a:rPr lang="en-US" sz="1100" dirty="0" smtClean="0"/>
-              <a:t>oltage controlled switches.</a:t>
+              <a:t>oltage controlled </a:t>
+            </a:r>
+            <a:r>
+              <a:rPr lang="en-US" sz="1100" dirty="0" smtClean="0"/>
+              <a:t>switches, although this is non-trivial, and needs a VC switch (with 2 inputs on each) for each of the 4 knobs to be completely effective.</a:t>
             </a:r>
             <a:endParaRPr lang="en-US" sz="1100" dirty="0"/>
           </a:p>
@@ -4842,14 +4911,14 @@
           <p:nvPr>
             <p:extLst>
               <p:ext uri="{D42A27DB-BD31-4B8C-83A1-F6EECF244321}">
-                <p14:modId xmlns:p14="http://schemas.microsoft.com/office/powerpoint/2010/main" val="3561208632"/>
+                <p14:modId xmlns:p14="http://schemas.microsoft.com/office/powerpoint/2010/main" val="4271889668"/>
               </p:ext>
             </p:extLst>
           </p:nvPr>
         </p:nvGraphicFramePr>
         <p:xfrm>
           <a:off x="242337" y="202750"/>
-          <a:ext cx="3695518" cy="2976879"/>
+          <a:ext cx="3695518" cy="2499359"/>
         </p:xfrm>
         <a:graphic>
           <a:graphicData uri="http://schemas.openxmlformats.org/drawingml/2006/table">
@@ -4861,8 +4930,8 @@
                 <a:gridCol w="789629"/>
                 <a:gridCol w="2905889"/>
               </a:tblGrid>
-              <a:tr h="370840">
-                <a:tc>
+              <a:tr h="219698">
+                <a:tc gridSpan="2">
                   <a:txBody>
                     <a:bodyPr/>
                     <a:lstStyle/>
@@ -4877,36 +4946,32 @@
                   </a:txBody>
                   <a:tcPr/>
                 </a:tc>
-                <a:tc>
-                  <a:txBody>
-                    <a:bodyPr/>
-                    <a:lstStyle/>
-                    <a:p>
-                      <a:r>
-                        <a:rPr lang="en-US" sz="1400" dirty="0" smtClean="0"/>
-                        <a:t>Description</a:t>
-                      </a:r>
+                <a:tc hMerge="1">
+                  <a:txBody>
+                    <a:bodyPr/>
+                    <a:lstStyle/>
+                    <a:p>
                       <a:endParaRPr lang="en-US" sz="1400" dirty="0"/>
                     </a:p>
                   </a:txBody>
                   <a:tcPr/>
                 </a:tc>
               </a:tr>
-              <a:tr h="370840">
-                <a:tc>
-                  <a:txBody>
-                    <a:bodyPr/>
-                    <a:lstStyle/>
-                    <a:p>
-                      <a:pPr algn="ctr"/>
-                      <a:r>
-                        <a:rPr lang="en-US" sz="1400" dirty="0" smtClean="0"/>
+              <a:tr h="219698">
+                <a:tc>
+                  <a:txBody>
+                    <a:bodyPr/>
+                    <a:lstStyle/>
+                    <a:p>
+                      <a:pPr algn="ctr"/>
+                      <a:r>
+                        <a:rPr lang="en-US" sz="1200" b="1" dirty="0" smtClean="0"/>
                         <a:t>Up</a:t>
                       </a:r>
-                      <a:endParaRPr lang="en-US" sz="1400" dirty="0"/>
-                    </a:p>
-                  </a:txBody>
-                  <a:tcPr/>
+                      <a:endParaRPr lang="en-US" sz="1200" b="1" dirty="0"/>
+                    </a:p>
+                  </a:txBody>
+                  <a:tcPr anchor="ctr"/>
                 </a:tc>
                 <a:tc>
                   <a:txBody>
@@ -4927,21 +4992,21 @@
                   <a:tcPr anchor="ctr"/>
                 </a:tc>
               </a:tr>
-              <a:tr h="370840">
-                <a:tc>
-                  <a:txBody>
-                    <a:bodyPr/>
-                    <a:lstStyle/>
-                    <a:p>
-                      <a:pPr algn="ctr"/>
-                      <a:r>
-                        <a:rPr lang="en-US" sz="1400" dirty="0" smtClean="0"/>
+              <a:tr h="219698">
+                <a:tc>
+                  <a:txBody>
+                    <a:bodyPr/>
+                    <a:lstStyle/>
+                    <a:p>
+                      <a:pPr algn="ctr"/>
+                      <a:r>
+                        <a:rPr lang="en-US" sz="1200" b="1" dirty="0" smtClean="0"/>
                         <a:t>Down</a:t>
                       </a:r>
-                      <a:endParaRPr lang="en-US" sz="1400" dirty="0"/>
-                    </a:p>
-                  </a:txBody>
-                  <a:tcPr/>
+                      <a:endParaRPr lang="en-US" sz="1200" b="1" dirty="0"/>
+                    </a:p>
+                  </a:txBody>
+                  <a:tcPr anchor="ctr"/>
                 </a:tc>
                 <a:tc>
                   <a:txBody>
@@ -4958,21 +5023,21 @@
                   <a:tcPr anchor="ctr"/>
                 </a:tc>
               </a:tr>
-              <a:tr h="370840">
-                <a:tc>
-                  <a:txBody>
-                    <a:bodyPr/>
-                    <a:lstStyle/>
-                    <a:p>
-                      <a:pPr algn="ctr"/>
-                      <a:r>
-                        <a:rPr lang="en-US" sz="1400" dirty="0" smtClean="0"/>
+              <a:tr h="270861">
+                <a:tc>
+                  <a:txBody>
+                    <a:bodyPr/>
+                    <a:lstStyle/>
+                    <a:p>
+                      <a:pPr algn="ctr"/>
+                      <a:r>
+                        <a:rPr lang="en-US" sz="1200" b="1" dirty="0" smtClean="0"/>
                         <a:t>Up/Down</a:t>
                       </a:r>
-                      <a:endParaRPr lang="en-US" sz="1400" dirty="0"/>
-                    </a:p>
-                  </a:txBody>
-                  <a:tcPr/>
+                      <a:endParaRPr lang="en-US" sz="1200" b="1" dirty="0"/>
+                    </a:p>
+                  </a:txBody>
+                  <a:tcPr anchor="ctr"/>
                 </a:tc>
                 <a:tc>
                   <a:txBody>
@@ -5005,21 +5070,21 @@
                   <a:tcPr anchor="ctr"/>
                 </a:tc>
               </a:tr>
-              <a:tr h="370840">
-                <a:tc>
-                  <a:txBody>
-                    <a:bodyPr/>
-                    <a:lstStyle/>
-                    <a:p>
-                      <a:pPr algn="ctr"/>
-                      <a:r>
-                        <a:rPr lang="en-US" sz="1400" dirty="0" smtClean="0"/>
+              <a:tr h="270861">
+                <a:tc>
+                  <a:txBody>
+                    <a:bodyPr/>
+                    <a:lstStyle/>
+                    <a:p>
+                      <a:pPr algn="ctr"/>
+                      <a:r>
+                        <a:rPr lang="en-US" sz="1200" b="1" dirty="0" smtClean="0"/>
                         <a:t>Root-Up</a:t>
                       </a:r>
-                      <a:endParaRPr lang="en-US" sz="1400" dirty="0"/>
-                    </a:p>
-                  </a:txBody>
-                  <a:tcPr/>
+                      <a:endParaRPr lang="en-US" sz="1200" b="1" dirty="0"/>
+                    </a:p>
+                  </a:txBody>
+                  <a:tcPr anchor="ctr"/>
                 </a:tc>
                 <a:tc>
                   <a:txBody>
@@ -5040,21 +5105,21 @@
                   <a:tcPr anchor="ctr"/>
                 </a:tc>
               </a:tr>
-              <a:tr h="370840">
-                <a:tc>
-                  <a:txBody>
-                    <a:bodyPr/>
-                    <a:lstStyle/>
-                    <a:p>
-                      <a:pPr algn="ctr"/>
-                      <a:r>
-                        <a:rPr lang="en-US" sz="1400" dirty="0" smtClean="0"/>
+              <a:tr h="270861">
+                <a:tc>
+                  <a:txBody>
+                    <a:bodyPr/>
+                    <a:lstStyle/>
+                    <a:p>
+                      <a:pPr algn="ctr"/>
+                      <a:r>
+                        <a:rPr lang="en-US" sz="1200" b="1" dirty="0" smtClean="0"/>
                         <a:t>Ping-Pong</a:t>
                       </a:r>
-                      <a:endParaRPr lang="en-US" sz="1400" dirty="0"/>
-                    </a:p>
-                  </a:txBody>
-                  <a:tcPr/>
+                      <a:endParaRPr lang="en-US" sz="1200" b="1" dirty="0"/>
+                    </a:p>
+                  </a:txBody>
+                  <a:tcPr anchor="ctr"/>
                 </a:tc>
                 <a:tc>
                   <a:txBody>
@@ -5075,21 +5140,21 @@
                   <a:tcPr anchor="ctr"/>
                 </a:tc>
               </a:tr>
-              <a:tr h="370840">
-                <a:tc>
-                  <a:txBody>
-                    <a:bodyPr/>
-                    <a:lstStyle/>
-                    <a:p>
-                      <a:pPr algn="ctr"/>
-                      <a:r>
-                        <a:rPr lang="en-US" sz="1400" dirty="0" smtClean="0"/>
+              <a:tr h="219698">
+                <a:tc>
+                  <a:txBody>
+                    <a:bodyPr/>
+                    <a:lstStyle/>
+                    <a:p>
+                      <a:pPr algn="ctr"/>
+                      <a:r>
+                        <a:rPr lang="en-US" sz="1200" b="1" dirty="0" smtClean="0"/>
                         <a:t>Random</a:t>
                       </a:r>
-                      <a:endParaRPr lang="en-US" sz="1400" dirty="0"/>
-                    </a:p>
-                  </a:txBody>
-                  <a:tcPr/>
+                      <a:endParaRPr lang="en-US" sz="1200" b="1" dirty="0"/>
+                    </a:p>
+                  </a:txBody>
+                  <a:tcPr anchor="ctr"/>
                 </a:tc>
                 <a:tc>
                   <a:txBody>
@@ -5119,14 +5184,14 @@
           <p:nvPr>
             <p:extLst>
               <p:ext uri="{D42A27DB-BD31-4B8C-83A1-F6EECF244321}">
-                <p14:modId xmlns:p14="http://schemas.microsoft.com/office/powerpoint/2010/main" val="181649314"/>
+                <p14:modId xmlns:p14="http://schemas.microsoft.com/office/powerpoint/2010/main" val="3723980835"/>
               </p:ext>
             </p:extLst>
           </p:nvPr>
         </p:nvGraphicFramePr>
         <p:xfrm>
           <a:off x="242337" y="3388367"/>
-          <a:ext cx="1422447" cy="3230879"/>
+          <a:ext cx="1422447" cy="3474719"/>
         </p:xfrm>
         <a:graphic>
           <a:graphicData uri="http://schemas.openxmlformats.org/drawingml/2006/table">
@@ -5197,7 +5262,7 @@
                       <a:pPr algn="ctr"/>
                       <a:r>
                         <a:rPr lang="en-US" sz="1000" dirty="0" smtClean="0"/>
-                        <a:t>Blues</a:t>
+                        <a:t>Ionian</a:t>
                       </a:r>
                       <a:endParaRPr lang="en-US" sz="1000" dirty="0"/>
                     </a:p>
@@ -5214,7 +5279,7 @@
                       <a:pPr algn="ctr"/>
                       <a:r>
                         <a:rPr lang="en-US" sz="1000" dirty="0" smtClean="0"/>
-                        <a:t>Augmented</a:t>
+                        <a:t>Aeolian</a:t>
                       </a:r>
                       <a:endParaRPr lang="en-US" sz="1000" dirty="0"/>
                     </a:p>
@@ -5231,7 +5296,7 @@
                       <a:pPr algn="ctr"/>
                       <a:r>
                         <a:rPr lang="en-US" sz="1000" dirty="0" smtClean="0"/>
-                        <a:t>Ionian</a:t>
+                        <a:t>Lydian</a:t>
                       </a:r>
                       <a:endParaRPr lang="en-US" sz="1000" dirty="0"/>
                     </a:p>
@@ -5247,8 +5312,8 @@
                     <a:p>
                       <a:pPr algn="ctr"/>
                       <a:r>
-                        <a:rPr lang="en-US" sz="1000" dirty="0" smtClean="0"/>
-                        <a:t>Aeolian</a:t>
+                        <a:rPr lang="en-US" sz="1000" dirty="0" err="1" smtClean="0"/>
+                        <a:t>Mixolydian</a:t>
                       </a:r>
                       <a:endParaRPr lang="en-US" sz="1000" dirty="0"/>
                     </a:p>
@@ -5265,7 +5330,7 @@
                       <a:pPr algn="ctr"/>
                       <a:r>
                         <a:rPr lang="en-US" sz="1000" dirty="0" smtClean="0"/>
-                        <a:t>Lydian</a:t>
+                        <a:t>Dorian</a:t>
                       </a:r>
                       <a:endParaRPr lang="en-US" sz="1000" dirty="0"/>
                     </a:p>
@@ -5281,8 +5346,8 @@
                     <a:p>
                       <a:pPr algn="ctr"/>
                       <a:r>
-                        <a:rPr lang="en-US" sz="1000" dirty="0" err="1" smtClean="0"/>
-                        <a:t>Mixolydian</a:t>
+                        <a:rPr lang="en-US" sz="1000" dirty="0" smtClean="0"/>
+                        <a:t>Phrygian</a:t>
                       </a:r>
                       <a:endParaRPr lang="en-US" sz="1000" dirty="0"/>
                     </a:p>
@@ -5298,8 +5363,8 @@
                     <a:p>
                       <a:pPr algn="ctr"/>
                       <a:r>
-                        <a:rPr lang="en-US" sz="1000" dirty="0" smtClean="0"/>
-                        <a:t>Dorian</a:t>
+                        <a:rPr lang="en-US" sz="1000" dirty="0" err="1" smtClean="0"/>
+                        <a:t>Locrian</a:t>
                       </a:r>
                       <a:endParaRPr lang="en-US" sz="1000" dirty="0"/>
                     </a:p>
@@ -5316,7 +5381,7 @@
                       <a:pPr algn="ctr"/>
                       <a:r>
                         <a:rPr lang="en-US" sz="1000" dirty="0" smtClean="0"/>
-                        <a:t>Phrygian</a:t>
+                        <a:t>Blues</a:t>
                       </a:r>
                       <a:endParaRPr lang="en-US" sz="1000" dirty="0"/>
                     </a:p>
@@ -5332,8 +5397,25 @@
                     <a:p>
                       <a:pPr algn="ctr"/>
                       <a:r>
-                        <a:rPr lang="en-US" sz="1000" dirty="0" err="1" smtClean="0"/>
-                        <a:t>Locrian</a:t>
+                        <a:rPr lang="en-US" sz="1000" dirty="0" smtClean="0"/>
+                        <a:t>Augmented</a:t>
+                      </a:r>
+                      <a:endParaRPr lang="en-US" sz="1000" dirty="0"/>
+                    </a:p>
+                  </a:txBody>
+                  <a:tcPr/>
+                </a:tc>
+              </a:tr>
+              <a:tr h="195897">
+                <a:tc>
+                  <a:txBody>
+                    <a:bodyPr/>
+                    <a:lstStyle/>
+                    <a:p>
+                      <a:pPr algn="ctr"/>
+                      <a:r>
+                        <a:rPr lang="en-US" sz="1000" smtClean="0"/>
+                        <a:t>Octaves</a:t>
                       </a:r>
                       <a:endParaRPr lang="en-US" sz="1000" dirty="0"/>
                     </a:p>
@@ -5430,11 +5512,7 @@
                       </a:r>
                       <a:r>
                         <a:rPr lang="en-US" sz="900" baseline="0" dirty="0" smtClean="0"/>
-                        <a:t> the distance </a:t>
-                      </a:r>
-                      <a:r>
-                        <a:rPr lang="en-US" sz="900" baseline="0" dirty="0" smtClean="0"/>
-                        <a:t>and </a:t>
+                        <a:t> the distance and </a:t>
                       </a:r>
                       <a:r>
                         <a:rPr lang="en-US" sz="900" baseline="0" smtClean="0"/>
@@ -5605,7 +5683,7 @@
         </p:nvSpPr>
         <p:spPr>
           <a:xfrm>
-            <a:off x="5806599" y="202750"/>
+            <a:off x="5806599" y="93260"/>
             <a:ext cx="2243648" cy="400110"/>
           </a:xfrm>
           <a:prstGeom prst="rect">

</xml_diff>

<commit_message>
More code tidying and fine tuning, and instruction sheet brought up to date with code
</commit_message>
<xml_diff>
--- a/FlexArp Instructions.pptx
+++ b/FlexArp Instructions.pptx
@@ -3097,21 +3097,21 @@
       </p:grpSpPr>
       <p:graphicFrame>
         <p:nvGraphicFramePr>
-          <p:cNvPr id="4" name="Table 3"/>
+          <p:cNvPr id="9" name="Table 8"/>
           <p:cNvGraphicFramePr>
             <a:graphicFrameLocks noGrp="1"/>
           </p:cNvGraphicFramePr>
           <p:nvPr>
             <p:extLst>
               <p:ext uri="{D42A27DB-BD31-4B8C-83A1-F6EECF244321}">
-                <p14:modId xmlns:p14="http://schemas.microsoft.com/office/powerpoint/2010/main" val="1993934835"/>
+                <p14:modId xmlns:p14="http://schemas.microsoft.com/office/powerpoint/2010/main" val="2788103454"/>
               </p:ext>
             </p:extLst>
           </p:nvPr>
         </p:nvGraphicFramePr>
         <p:xfrm>
-          <a:off x="7061549" y="3217815"/>
-          <a:ext cx="2649693" cy="1066800"/>
+          <a:off x="3833352" y="4336391"/>
+          <a:ext cx="1902244" cy="1082040"/>
         </p:xfrm>
         <a:graphic>
           <a:graphicData uri="http://schemas.openxmlformats.org/drawingml/2006/table">
@@ -3120,12 +3120,12 @@
                 <a:tableStyleId>{3C2FFA5D-87B4-456A-9821-1D502468CF0F}</a:tableStyleId>
               </a:tblPr>
               <a:tblGrid>
-                <a:gridCol w="824833"/>
-                <a:gridCol w="800377"/>
-                <a:gridCol w="522913"/>
-                <a:gridCol w="501570"/>
+                <a:gridCol w="571750"/>
+                <a:gridCol w="595006"/>
+                <a:gridCol w="375405"/>
+                <a:gridCol w="360083"/>
               </a:tblGrid>
-              <a:tr h="121615">
+              <a:tr h="266700">
                 <a:tc>
                   <a:txBody>
                     <a:bodyPr/>
@@ -3156,7 +3156,64 @@
                   </a:txBody>
                   <a:tcPr/>
                 </a:tc>
-                <a:tc rowSpan="2">
+                <a:tc gridSpan="2">
+                  <a:txBody>
+                    <a:bodyPr/>
+                    <a:lstStyle/>
+                    <a:p>
+                      <a:pPr algn="ctr"/>
+                      <a:r>
+                        <a:rPr lang="en-US" sz="1200" b="1" i="1" dirty="0" smtClean="0"/>
+                        <a:t>Default</a:t>
+                      </a:r>
+                      <a:endParaRPr lang="en-US" sz="1100" b="1" i="1" dirty="0"/>
+                    </a:p>
+                  </a:txBody>
+                  <a:tcPr anchor="ctr"/>
+                </a:tc>
+                <a:tc hMerge="1">
+                  <a:txBody>
+                    <a:bodyPr/>
+                    <a:lstStyle/>
+                    <a:p>
+                      <a:endParaRPr lang="en-US" dirty="0"/>
+                    </a:p>
+                  </a:txBody>
+                  <a:tcPr anchor="ctr"/>
+                </a:tc>
+              </a:tr>
+              <a:tr h="121615">
+                <a:tc>
+                  <a:txBody>
+                    <a:bodyPr/>
+                    <a:lstStyle/>
+                    <a:p>
+                      <a:pPr algn="ctr"/>
+                      <a:r>
+                        <a:rPr lang="en-US" sz="1100" dirty="0" smtClean="0"/>
+                        <a:t>Mode</a:t>
+                      </a:r>
+                      <a:endParaRPr lang="en-US" sz="1100" dirty="0"/>
+                    </a:p>
+                  </a:txBody>
+                  <a:tcPr/>
+                </a:tc>
+                <a:tc>
+                  <a:txBody>
+                    <a:bodyPr/>
+                    <a:lstStyle/>
+                    <a:p>
+                      <a:pPr algn="ctr"/>
+                      <a:r>
+                        <a:rPr lang="en-US" sz="1100" dirty="0" smtClean="0"/>
+                        <a:t>Scale</a:t>
+                      </a:r>
+                      <a:endParaRPr lang="en-US" sz="1100" dirty="0"/>
+                    </a:p>
+                  </a:txBody>
+                  <a:tcPr/>
+                </a:tc>
+                <a:tc>
                   <a:txBody>
                     <a:bodyPr/>
                     <a:lstStyle/>
@@ -3171,7 +3228,7 @@
                   </a:txBody>
                   <a:tcPr anchor="ctr"/>
                 </a:tc>
-                <a:tc rowSpan="2">
+                <a:tc>
                   <a:txBody>
                     <a:bodyPr/>
                     <a:lstStyle/>
@@ -3195,58 +3252,6 @@
                     <a:p>
                       <a:pPr algn="ctr"/>
                       <a:r>
-                        <a:rPr lang="en-US" sz="1100" dirty="0" smtClean="0"/>
-                        <a:t>Mode</a:t>
-                      </a:r>
-                      <a:endParaRPr lang="en-US" sz="1100" dirty="0"/>
-                    </a:p>
-                  </a:txBody>
-                  <a:tcPr/>
-                </a:tc>
-                <a:tc>
-                  <a:txBody>
-                    <a:bodyPr/>
-                    <a:lstStyle/>
-                    <a:p>
-                      <a:pPr algn="ctr"/>
-                      <a:r>
-                        <a:rPr lang="en-US" sz="1100" dirty="0" smtClean="0"/>
-                        <a:t>Octaves</a:t>
-                      </a:r>
-                      <a:endParaRPr lang="en-US" sz="1100" dirty="0"/>
-                    </a:p>
-                  </a:txBody>
-                  <a:tcPr/>
-                </a:tc>
-                <a:tc vMerge="1">
-                  <a:txBody>
-                    <a:bodyPr/>
-                    <a:lstStyle/>
-                    <a:p>
-                      <a:endParaRPr lang="en-US" sz="1400" dirty="0"/>
-                    </a:p>
-                  </a:txBody>
-                  <a:tcPr/>
-                </a:tc>
-                <a:tc vMerge="1">
-                  <a:txBody>
-                    <a:bodyPr/>
-                    <a:lstStyle/>
-                    <a:p>
-                      <a:endParaRPr lang="en-US" sz="1400" dirty="0"/>
-                    </a:p>
-                  </a:txBody>
-                  <a:tcPr/>
-                </a:tc>
-              </a:tr>
-              <a:tr h="121615">
-                <a:tc>
-                  <a:txBody>
-                    <a:bodyPr/>
-                    <a:lstStyle/>
-                    <a:p>
-                      <a:pPr algn="ctr"/>
-                      <a:r>
                         <a:rPr lang="en-US" sz="1200" b="1" dirty="0" smtClean="0"/>
                         <a:t>A2</a:t>
                       </a:r>
@@ -3287,10 +3292,6 @@
                     <a:lstStyle/>
                     <a:p>
                       <a:pPr algn="ctr"/>
-                      <a:r>
-                        <a:rPr lang="en-US" sz="1200" dirty="0" smtClean="0"/>
-                        <a:t>On</a:t>
-                      </a:r>
                       <a:endParaRPr lang="en-US" sz="1200" dirty="0"/>
                     </a:p>
                   </a:txBody>
@@ -3306,11 +3307,7 @@
                       <a:pPr algn="ctr"/>
                       <a:r>
                         <a:rPr lang="en-US" sz="1100" dirty="0" smtClean="0"/>
-                        <a:t>Steps / </a:t>
-                      </a:r>
-                      <a:r>
-                        <a:rPr lang="en-US" sz="1100" dirty="0" err="1" smtClean="0"/>
-                        <a:t>Dist</a:t>
+                        <a:t>S/D</a:t>
                       </a:r>
                       <a:endParaRPr lang="en-US" sz="1100" dirty="0"/>
                     </a:p>
@@ -3325,7 +3322,7 @@
                       <a:pPr algn="ctr"/>
                       <a:r>
                         <a:rPr lang="en-US" sz="1100" dirty="0" smtClean="0"/>
-                        <a:t>Scale</a:t>
+                        <a:t>O/R</a:t>
                       </a:r>
                       <a:endParaRPr lang="en-US" sz="1100" dirty="0"/>
                     </a:p>
@@ -3357,1369 +3354,6 @@
           </a:graphicData>
         </a:graphic>
       </p:graphicFrame>
-      <p:graphicFrame>
-        <p:nvGraphicFramePr>
-          <p:cNvPr id="5" name="Table 4"/>
-          <p:cNvGraphicFramePr>
-            <a:graphicFrameLocks noGrp="1"/>
-          </p:cNvGraphicFramePr>
-          <p:nvPr>
-            <p:extLst>
-              <p:ext uri="{D42A27DB-BD31-4B8C-83A1-F6EECF244321}">
-                <p14:modId xmlns:p14="http://schemas.microsoft.com/office/powerpoint/2010/main" val="2807597022"/>
-              </p:ext>
-            </p:extLst>
-          </p:nvPr>
-        </p:nvGraphicFramePr>
-        <p:xfrm>
-          <a:off x="4152486" y="5550262"/>
-          <a:ext cx="2649693" cy="1066800"/>
-        </p:xfrm>
-        <a:graphic>
-          <a:graphicData uri="http://schemas.openxmlformats.org/drawingml/2006/table">
-            <a:tbl>
-              <a:tblPr>
-                <a:tableStyleId>{3C2FFA5D-87B4-456A-9821-1D502468CF0F}</a:tableStyleId>
-              </a:tblPr>
-              <a:tblGrid>
-                <a:gridCol w="824833"/>
-                <a:gridCol w="800377"/>
-                <a:gridCol w="522913"/>
-                <a:gridCol w="501570"/>
-              </a:tblGrid>
-              <a:tr h="121615">
-                <a:tc>
-                  <a:txBody>
-                    <a:bodyPr/>
-                    <a:lstStyle/>
-                    <a:p>
-                      <a:pPr algn="ctr"/>
-                      <a:r>
-                        <a:rPr lang="en-US" sz="1200" b="1" dirty="0" smtClean="0"/>
-                        <a:t>A0</a:t>
-                      </a:r>
-                      <a:endParaRPr lang="en-US" sz="1200" b="1" dirty="0"/>
-                    </a:p>
-                  </a:txBody>
-                  <a:tcPr/>
-                </a:tc>
-                <a:tc>
-                  <a:txBody>
-                    <a:bodyPr/>
-                    <a:lstStyle/>
-                    <a:p>
-                      <a:pPr algn="ctr"/>
-                      <a:r>
-                        <a:rPr lang="en-US" sz="1200" b="1" dirty="0" smtClean="0"/>
-                        <a:t>A1</a:t>
-                      </a:r>
-                      <a:endParaRPr lang="en-US" sz="1200" b="1" dirty="0"/>
-                    </a:p>
-                  </a:txBody>
-                  <a:tcPr/>
-                </a:tc>
-                <a:tc rowSpan="2">
-                  <a:txBody>
-                    <a:bodyPr/>
-                    <a:lstStyle/>
-                    <a:p>
-                      <a:pPr algn="ctr"/>
-                      <a:r>
-                        <a:rPr lang="en-US" sz="1200" b="1" dirty="0" smtClean="0"/>
-                        <a:t>D0</a:t>
-                      </a:r>
-                      <a:endParaRPr lang="en-US" sz="1200" b="1" dirty="0"/>
-                    </a:p>
-                  </a:txBody>
-                  <a:tcPr anchor="ctr"/>
-                </a:tc>
-                <a:tc rowSpan="2">
-                  <a:txBody>
-                    <a:bodyPr/>
-                    <a:lstStyle/>
-                    <a:p>
-                      <a:pPr algn="ctr"/>
-                      <a:r>
-                        <a:rPr lang="en-US" sz="1200" b="1" dirty="0" smtClean="0"/>
-                        <a:t>D1</a:t>
-                      </a:r>
-                      <a:endParaRPr lang="en-US" sz="1200" b="1" dirty="0"/>
-                    </a:p>
-                  </a:txBody>
-                  <a:tcPr anchor="ctr"/>
-                </a:tc>
-              </a:tr>
-              <a:tr h="121615">
-                <a:tc>
-                  <a:txBody>
-                    <a:bodyPr/>
-                    <a:lstStyle/>
-                    <a:p>
-                      <a:pPr marL="0" marR="0" indent="0" algn="ctr" defTabSz="457200" rtl="0" eaLnBrk="1" fontAlgn="auto" latinLnBrk="0" hangingPunct="1">
-                        <a:lnSpc>
-                          <a:spcPct val="100000"/>
-                        </a:lnSpc>
-                        <a:spcBef>
-                          <a:spcPts val="0"/>
-                        </a:spcBef>
-                        <a:spcAft>
-                          <a:spcPts val="0"/>
-                        </a:spcAft>
-                        <a:buClrTx/>
-                        <a:buSzTx/>
-                        <a:buFontTx/>
-                        <a:buNone/>
-                        <a:tabLst/>
-                        <a:defRPr/>
-                      </a:pPr>
-                      <a:r>
-                        <a:rPr lang="en-US" sz="1100" dirty="0" smtClean="0"/>
-                        <a:t>Steps / </a:t>
-                      </a:r>
-                      <a:r>
-                        <a:rPr lang="en-US" sz="1100" dirty="0" err="1" smtClean="0"/>
-                        <a:t>Dist</a:t>
-                      </a:r>
-                      <a:endParaRPr lang="en-US" sz="1100" dirty="0" smtClean="0"/>
-                    </a:p>
-                  </a:txBody>
-                  <a:tcPr/>
-                </a:tc>
-                <a:tc>
-                  <a:txBody>
-                    <a:bodyPr/>
-                    <a:lstStyle/>
-                    <a:p>
-                      <a:pPr algn="ctr"/>
-                      <a:r>
-                        <a:rPr lang="en-US" sz="1100" dirty="0" smtClean="0"/>
-                        <a:t>Scale</a:t>
-                      </a:r>
-                      <a:endParaRPr lang="en-US" sz="1100" dirty="0"/>
-                    </a:p>
-                  </a:txBody>
-                  <a:tcPr/>
-                </a:tc>
-                <a:tc vMerge="1">
-                  <a:txBody>
-                    <a:bodyPr/>
-                    <a:lstStyle/>
-                    <a:p>
-                      <a:endParaRPr lang="en-US" sz="1400" dirty="0"/>
-                    </a:p>
-                  </a:txBody>
-                  <a:tcPr/>
-                </a:tc>
-                <a:tc vMerge="1">
-                  <a:txBody>
-                    <a:bodyPr/>
-                    <a:lstStyle/>
-                    <a:p>
-                      <a:endParaRPr lang="en-US" sz="1400" dirty="0"/>
-                    </a:p>
-                  </a:txBody>
-                  <a:tcPr/>
-                </a:tc>
-              </a:tr>
-              <a:tr h="121615">
-                <a:tc>
-                  <a:txBody>
-                    <a:bodyPr/>
-                    <a:lstStyle/>
-                    <a:p>
-                      <a:pPr algn="ctr"/>
-                      <a:r>
-                        <a:rPr lang="en-US" sz="1200" b="1" dirty="0" smtClean="0"/>
-                        <a:t>A2</a:t>
-                      </a:r>
-                      <a:endParaRPr lang="en-US" sz="1200" b="1" dirty="0"/>
-                    </a:p>
-                  </a:txBody>
-                  <a:tcPr/>
-                </a:tc>
-                <a:tc>
-                  <a:txBody>
-                    <a:bodyPr/>
-                    <a:lstStyle/>
-                    <a:p>
-                      <a:pPr algn="ctr"/>
-                      <a:r>
-                        <a:rPr lang="en-US" sz="1200" b="1" dirty="0" smtClean="0"/>
-                        <a:t>A3</a:t>
-                      </a:r>
-                      <a:endParaRPr lang="en-US" sz="1200" b="1" dirty="0"/>
-                    </a:p>
-                  </a:txBody>
-                  <a:tcPr/>
-                </a:tc>
-                <a:tc rowSpan="2">
-                  <a:txBody>
-                    <a:bodyPr/>
-                    <a:lstStyle/>
-                    <a:p>
-                      <a:pPr algn="ctr"/>
-                      <a:endParaRPr lang="en-US" sz="1200" dirty="0"/>
-                    </a:p>
-                  </a:txBody>
-                  <a:tcPr anchor="ctr"/>
-                </a:tc>
-                <a:tc rowSpan="2">
-                  <a:txBody>
-                    <a:bodyPr/>
-                    <a:lstStyle/>
-                    <a:p>
-                      <a:pPr algn="ctr"/>
-                      <a:r>
-                        <a:rPr lang="en-US" sz="1200" dirty="0" smtClean="0"/>
-                        <a:t>Flash</a:t>
-                      </a:r>
-                      <a:endParaRPr lang="en-US" sz="1200" dirty="0"/>
-                    </a:p>
-                  </a:txBody>
-                  <a:tcPr anchor="ctr"/>
-                </a:tc>
-              </a:tr>
-              <a:tr h="170261">
-                <a:tc>
-                  <a:txBody>
-                    <a:bodyPr/>
-                    <a:lstStyle/>
-                    <a:p>
-                      <a:pPr algn="ctr"/>
-                      <a:r>
-                        <a:rPr lang="en-US" sz="1100" dirty="0" smtClean="0"/>
-                        <a:t>Octaves</a:t>
-                      </a:r>
-                      <a:endParaRPr lang="en-US" sz="1100" dirty="0"/>
-                    </a:p>
-                  </a:txBody>
-                  <a:tcPr/>
-                </a:tc>
-                <a:tc>
-                  <a:txBody>
-                    <a:bodyPr/>
-                    <a:lstStyle/>
-                    <a:p>
-                      <a:pPr algn="ctr"/>
-                      <a:r>
-                        <a:rPr lang="en-US" sz="1100" dirty="0" smtClean="0"/>
-                        <a:t>Mode</a:t>
-                      </a:r>
-                      <a:endParaRPr lang="en-US" sz="1100" dirty="0"/>
-                    </a:p>
-                  </a:txBody>
-                  <a:tcPr/>
-                </a:tc>
-                <a:tc vMerge="1">
-                  <a:txBody>
-                    <a:bodyPr/>
-                    <a:lstStyle/>
-                    <a:p>
-                      <a:endParaRPr lang="en-US" sz="1400" dirty="0"/>
-                    </a:p>
-                  </a:txBody>
-                  <a:tcPr/>
-                </a:tc>
-                <a:tc vMerge="1">
-                  <a:txBody>
-                    <a:bodyPr/>
-                    <a:lstStyle/>
-                    <a:p>
-                      <a:endParaRPr lang="en-US" sz="1400" dirty="0"/>
-                    </a:p>
-                  </a:txBody>
-                  <a:tcPr/>
-                </a:tc>
-              </a:tr>
-            </a:tbl>
-          </a:graphicData>
-        </a:graphic>
-      </p:graphicFrame>
-      <p:graphicFrame>
-        <p:nvGraphicFramePr>
-          <p:cNvPr id="6" name="Table 5"/>
-          <p:cNvGraphicFramePr>
-            <a:graphicFrameLocks noGrp="1"/>
-          </p:cNvGraphicFramePr>
-          <p:nvPr>
-            <p:extLst>
-              <p:ext uri="{D42A27DB-BD31-4B8C-83A1-F6EECF244321}">
-                <p14:modId xmlns:p14="http://schemas.microsoft.com/office/powerpoint/2010/main" val="1083594627"/>
-              </p:ext>
-            </p:extLst>
-          </p:nvPr>
-        </p:nvGraphicFramePr>
-        <p:xfrm>
-          <a:off x="7061549" y="5550262"/>
-          <a:ext cx="2649693" cy="1066800"/>
-        </p:xfrm>
-        <a:graphic>
-          <a:graphicData uri="http://schemas.openxmlformats.org/drawingml/2006/table">
-            <a:tbl>
-              <a:tblPr>
-                <a:tableStyleId>{3C2FFA5D-87B4-456A-9821-1D502468CF0F}</a:tableStyleId>
-              </a:tblPr>
-              <a:tblGrid>
-                <a:gridCol w="824833"/>
-                <a:gridCol w="800377"/>
-                <a:gridCol w="522913"/>
-                <a:gridCol w="501570"/>
-              </a:tblGrid>
-              <a:tr h="121615">
-                <a:tc>
-                  <a:txBody>
-                    <a:bodyPr/>
-                    <a:lstStyle/>
-                    <a:p>
-                      <a:pPr algn="ctr"/>
-                      <a:r>
-                        <a:rPr lang="en-US" sz="1200" b="1" dirty="0" smtClean="0"/>
-                        <a:t>A0</a:t>
-                      </a:r>
-                      <a:endParaRPr lang="en-US" sz="1200" b="1" dirty="0"/>
-                    </a:p>
-                  </a:txBody>
-                  <a:tcPr/>
-                </a:tc>
-                <a:tc>
-                  <a:txBody>
-                    <a:bodyPr/>
-                    <a:lstStyle/>
-                    <a:p>
-                      <a:pPr algn="ctr"/>
-                      <a:r>
-                        <a:rPr lang="en-US" sz="1200" b="1" dirty="0" smtClean="0"/>
-                        <a:t>A1</a:t>
-                      </a:r>
-                      <a:endParaRPr lang="en-US" sz="1200" b="1" dirty="0"/>
-                    </a:p>
-                  </a:txBody>
-                  <a:tcPr/>
-                </a:tc>
-                <a:tc rowSpan="2">
-                  <a:txBody>
-                    <a:bodyPr/>
-                    <a:lstStyle/>
-                    <a:p>
-                      <a:pPr algn="ctr"/>
-                      <a:r>
-                        <a:rPr lang="en-US" sz="1200" b="1" dirty="0" smtClean="0"/>
-                        <a:t>D0</a:t>
-                      </a:r>
-                      <a:endParaRPr lang="en-US" sz="1200" b="1" dirty="0"/>
-                    </a:p>
-                  </a:txBody>
-                  <a:tcPr anchor="ctr"/>
-                </a:tc>
-                <a:tc rowSpan="2">
-                  <a:txBody>
-                    <a:bodyPr/>
-                    <a:lstStyle/>
-                    <a:p>
-                      <a:pPr algn="ctr"/>
-                      <a:r>
-                        <a:rPr lang="en-US" sz="1200" b="1" dirty="0" smtClean="0"/>
-                        <a:t>D1</a:t>
-                      </a:r>
-                      <a:endParaRPr lang="en-US" sz="1200" b="1" dirty="0"/>
-                    </a:p>
-                  </a:txBody>
-                  <a:tcPr anchor="ctr"/>
-                </a:tc>
-              </a:tr>
-              <a:tr h="121615">
-                <a:tc>
-                  <a:txBody>
-                    <a:bodyPr/>
-                    <a:lstStyle/>
-                    <a:p>
-                      <a:pPr marL="0" marR="0" indent="0" algn="ctr" defTabSz="457200" rtl="0" eaLnBrk="1" fontAlgn="auto" latinLnBrk="0" hangingPunct="1">
-                        <a:lnSpc>
-                          <a:spcPct val="100000"/>
-                        </a:lnSpc>
-                        <a:spcBef>
-                          <a:spcPts val="0"/>
-                        </a:spcBef>
-                        <a:spcAft>
-                          <a:spcPts val="0"/>
-                        </a:spcAft>
-                        <a:buClrTx/>
-                        <a:buSzTx/>
-                        <a:buFontTx/>
-                        <a:buNone/>
-                        <a:tabLst/>
-                        <a:defRPr/>
-                      </a:pPr>
-                      <a:r>
-                        <a:rPr lang="en-US" sz="1100" dirty="0" smtClean="0"/>
-                        <a:t>Steps / </a:t>
-                      </a:r>
-                      <a:r>
-                        <a:rPr lang="en-US" sz="1100" dirty="0" err="1" smtClean="0"/>
-                        <a:t>Dist</a:t>
-                      </a:r>
-                      <a:endParaRPr lang="en-US" sz="1100" dirty="0" smtClean="0"/>
-                    </a:p>
-                  </a:txBody>
-                  <a:tcPr/>
-                </a:tc>
-                <a:tc>
-                  <a:txBody>
-                    <a:bodyPr/>
-                    <a:lstStyle/>
-                    <a:p>
-                      <a:pPr algn="ctr"/>
-                      <a:r>
-                        <a:rPr lang="en-US" sz="1100" dirty="0" smtClean="0"/>
-                        <a:t>Octaves</a:t>
-                      </a:r>
-                      <a:endParaRPr lang="en-US" sz="1100" dirty="0"/>
-                    </a:p>
-                  </a:txBody>
-                  <a:tcPr/>
-                </a:tc>
-                <a:tc vMerge="1">
-                  <a:txBody>
-                    <a:bodyPr/>
-                    <a:lstStyle/>
-                    <a:p>
-                      <a:endParaRPr lang="en-US" sz="1400" dirty="0"/>
-                    </a:p>
-                  </a:txBody>
-                  <a:tcPr/>
-                </a:tc>
-                <a:tc vMerge="1">
-                  <a:txBody>
-                    <a:bodyPr/>
-                    <a:lstStyle/>
-                    <a:p>
-                      <a:endParaRPr lang="en-US" sz="1400" dirty="0"/>
-                    </a:p>
-                  </a:txBody>
-                  <a:tcPr/>
-                </a:tc>
-              </a:tr>
-              <a:tr h="121615">
-                <a:tc>
-                  <a:txBody>
-                    <a:bodyPr/>
-                    <a:lstStyle/>
-                    <a:p>
-                      <a:pPr algn="ctr"/>
-                      <a:r>
-                        <a:rPr lang="en-US" sz="1200" b="1" dirty="0" smtClean="0"/>
-                        <a:t>A2</a:t>
-                      </a:r>
-                      <a:endParaRPr lang="en-US" sz="1200" b="1" dirty="0"/>
-                    </a:p>
-                  </a:txBody>
-                  <a:tcPr/>
-                </a:tc>
-                <a:tc>
-                  <a:txBody>
-                    <a:bodyPr/>
-                    <a:lstStyle/>
-                    <a:p>
-                      <a:pPr algn="ctr"/>
-                      <a:r>
-                        <a:rPr lang="en-US" sz="1200" b="1" dirty="0" smtClean="0"/>
-                        <a:t>A3</a:t>
-                      </a:r>
-                      <a:endParaRPr lang="en-US" sz="1200" b="1" dirty="0"/>
-                    </a:p>
-                  </a:txBody>
-                  <a:tcPr/>
-                </a:tc>
-                <a:tc rowSpan="2">
-                  <a:txBody>
-                    <a:bodyPr/>
-                    <a:lstStyle/>
-                    <a:p>
-                      <a:pPr algn="ctr"/>
-                      <a:r>
-                        <a:rPr lang="en-US" sz="1200" dirty="0" smtClean="0"/>
-                        <a:t>Flash</a:t>
-                      </a:r>
-                      <a:endParaRPr lang="en-US" sz="1200" dirty="0"/>
-                    </a:p>
-                  </a:txBody>
-                  <a:tcPr anchor="ctr"/>
-                </a:tc>
-                <a:tc rowSpan="2">
-                  <a:txBody>
-                    <a:bodyPr/>
-                    <a:lstStyle/>
-                    <a:p>
-                      <a:pPr algn="ctr"/>
-                      <a:endParaRPr lang="en-US" sz="1200" dirty="0"/>
-                    </a:p>
-                  </a:txBody>
-                  <a:tcPr anchor="ctr"/>
-                </a:tc>
-              </a:tr>
-              <a:tr h="170261">
-                <a:tc>
-                  <a:txBody>
-                    <a:bodyPr/>
-                    <a:lstStyle/>
-                    <a:p>
-                      <a:pPr algn="ctr"/>
-                      <a:r>
-                        <a:rPr lang="en-US" sz="1100" dirty="0" smtClean="0"/>
-                        <a:t>Mode</a:t>
-                      </a:r>
-                      <a:endParaRPr lang="en-US" sz="1100" dirty="0"/>
-                    </a:p>
-                  </a:txBody>
-                  <a:tcPr/>
-                </a:tc>
-                <a:tc>
-                  <a:txBody>
-                    <a:bodyPr/>
-                    <a:lstStyle/>
-                    <a:p>
-                      <a:pPr algn="ctr"/>
-                      <a:r>
-                        <a:rPr lang="en-US" sz="1100" dirty="0" smtClean="0"/>
-                        <a:t>Scale</a:t>
-                      </a:r>
-                      <a:endParaRPr lang="en-US" sz="1100" dirty="0"/>
-                    </a:p>
-                  </a:txBody>
-                  <a:tcPr/>
-                </a:tc>
-                <a:tc vMerge="1">
-                  <a:txBody>
-                    <a:bodyPr/>
-                    <a:lstStyle/>
-                    <a:p>
-                      <a:endParaRPr lang="en-US" sz="1400" dirty="0"/>
-                    </a:p>
-                  </a:txBody>
-                  <a:tcPr/>
-                </a:tc>
-                <a:tc vMerge="1">
-                  <a:txBody>
-                    <a:bodyPr/>
-                    <a:lstStyle/>
-                    <a:p>
-                      <a:endParaRPr lang="en-US" sz="1400" dirty="0"/>
-                    </a:p>
-                  </a:txBody>
-                  <a:tcPr/>
-                </a:tc>
-              </a:tr>
-            </a:tbl>
-          </a:graphicData>
-        </a:graphic>
-      </p:graphicFrame>
-      <p:graphicFrame>
-        <p:nvGraphicFramePr>
-          <p:cNvPr id="7" name="Table 6"/>
-          <p:cNvGraphicFramePr>
-            <a:graphicFrameLocks noGrp="1"/>
-          </p:cNvGraphicFramePr>
-          <p:nvPr>
-            <p:extLst>
-              <p:ext uri="{D42A27DB-BD31-4B8C-83A1-F6EECF244321}">
-                <p14:modId xmlns:p14="http://schemas.microsoft.com/office/powerpoint/2010/main" val="2662080839"/>
-              </p:ext>
-            </p:extLst>
-          </p:nvPr>
-        </p:nvGraphicFramePr>
-        <p:xfrm>
-          <a:off x="7061549" y="4393021"/>
-          <a:ext cx="2649693" cy="1066800"/>
-        </p:xfrm>
-        <a:graphic>
-          <a:graphicData uri="http://schemas.openxmlformats.org/drawingml/2006/table">
-            <a:tbl>
-              <a:tblPr>
-                <a:tableStyleId>{3C2FFA5D-87B4-456A-9821-1D502468CF0F}</a:tableStyleId>
-              </a:tblPr>
-              <a:tblGrid>
-                <a:gridCol w="824833"/>
-                <a:gridCol w="800377"/>
-                <a:gridCol w="522913"/>
-                <a:gridCol w="501570"/>
-              </a:tblGrid>
-              <a:tr h="121615">
-                <a:tc>
-                  <a:txBody>
-                    <a:bodyPr/>
-                    <a:lstStyle/>
-                    <a:p>
-                      <a:pPr algn="ctr"/>
-                      <a:r>
-                        <a:rPr lang="en-US" sz="1200" b="1" dirty="0" smtClean="0"/>
-                        <a:t>A0</a:t>
-                      </a:r>
-                      <a:endParaRPr lang="en-US" sz="1200" b="1" dirty="0"/>
-                    </a:p>
-                  </a:txBody>
-                  <a:tcPr/>
-                </a:tc>
-                <a:tc>
-                  <a:txBody>
-                    <a:bodyPr/>
-                    <a:lstStyle/>
-                    <a:p>
-                      <a:pPr algn="ctr"/>
-                      <a:r>
-                        <a:rPr lang="en-US" sz="1200" b="1" dirty="0" smtClean="0"/>
-                        <a:t>A1</a:t>
-                      </a:r>
-                      <a:endParaRPr lang="en-US" sz="1200" b="1" dirty="0"/>
-                    </a:p>
-                  </a:txBody>
-                  <a:tcPr/>
-                </a:tc>
-                <a:tc rowSpan="2">
-                  <a:txBody>
-                    <a:bodyPr/>
-                    <a:lstStyle/>
-                    <a:p>
-                      <a:pPr algn="ctr"/>
-                      <a:r>
-                        <a:rPr lang="en-US" sz="1200" b="1" dirty="0" smtClean="0"/>
-                        <a:t>D0</a:t>
-                      </a:r>
-                      <a:endParaRPr lang="en-US" sz="1200" b="1" dirty="0"/>
-                    </a:p>
-                  </a:txBody>
-                  <a:tcPr anchor="ctr"/>
-                </a:tc>
-                <a:tc rowSpan="2">
-                  <a:txBody>
-                    <a:bodyPr/>
-                    <a:lstStyle/>
-                    <a:p>
-                      <a:pPr algn="ctr"/>
-                      <a:r>
-                        <a:rPr lang="en-US" sz="1200" b="1" dirty="0" smtClean="0"/>
-                        <a:t>D1</a:t>
-                      </a:r>
-                      <a:endParaRPr lang="en-US" sz="1200" b="1" dirty="0"/>
-                    </a:p>
-                  </a:txBody>
-                  <a:tcPr anchor="ctr"/>
-                </a:tc>
-              </a:tr>
-              <a:tr h="121615">
-                <a:tc>
-                  <a:txBody>
-                    <a:bodyPr/>
-                    <a:lstStyle/>
-                    <a:p>
-                      <a:pPr marL="0" marR="0" indent="0" algn="ctr" defTabSz="457200" rtl="0" eaLnBrk="1" fontAlgn="auto" latinLnBrk="0" hangingPunct="1">
-                        <a:lnSpc>
-                          <a:spcPct val="100000"/>
-                        </a:lnSpc>
-                        <a:spcBef>
-                          <a:spcPts val="0"/>
-                        </a:spcBef>
-                        <a:spcAft>
-                          <a:spcPts val="0"/>
-                        </a:spcAft>
-                        <a:buClrTx/>
-                        <a:buSzTx/>
-                        <a:buFontTx/>
-                        <a:buNone/>
-                        <a:tabLst/>
-                        <a:defRPr/>
-                      </a:pPr>
-                      <a:r>
-                        <a:rPr lang="en-US" sz="1100" dirty="0" smtClean="0"/>
-                        <a:t>Steps / </a:t>
-                      </a:r>
-                      <a:r>
-                        <a:rPr lang="en-US" sz="1100" dirty="0" err="1" smtClean="0"/>
-                        <a:t>Dist</a:t>
-                      </a:r>
-                      <a:endParaRPr lang="en-US" sz="1100" dirty="0" smtClean="0"/>
-                    </a:p>
-                  </a:txBody>
-                  <a:tcPr/>
-                </a:tc>
-                <a:tc>
-                  <a:txBody>
-                    <a:bodyPr/>
-                    <a:lstStyle/>
-                    <a:p>
-                      <a:pPr algn="ctr"/>
-                      <a:r>
-                        <a:rPr lang="en-US" sz="1100" dirty="0" smtClean="0"/>
-                        <a:t>Mode</a:t>
-                      </a:r>
-                      <a:endParaRPr lang="en-US" sz="1100" dirty="0"/>
-                    </a:p>
-                  </a:txBody>
-                  <a:tcPr/>
-                </a:tc>
-                <a:tc vMerge="1">
-                  <a:txBody>
-                    <a:bodyPr/>
-                    <a:lstStyle/>
-                    <a:p>
-                      <a:endParaRPr lang="en-US" sz="1400" dirty="0"/>
-                    </a:p>
-                  </a:txBody>
-                  <a:tcPr/>
-                </a:tc>
-                <a:tc vMerge="1">
-                  <a:txBody>
-                    <a:bodyPr/>
-                    <a:lstStyle/>
-                    <a:p>
-                      <a:endParaRPr lang="en-US" sz="1400" dirty="0"/>
-                    </a:p>
-                  </a:txBody>
-                  <a:tcPr/>
-                </a:tc>
-              </a:tr>
-              <a:tr h="121615">
-                <a:tc>
-                  <a:txBody>
-                    <a:bodyPr/>
-                    <a:lstStyle/>
-                    <a:p>
-                      <a:pPr algn="ctr"/>
-                      <a:r>
-                        <a:rPr lang="en-US" sz="1200" b="1" dirty="0" smtClean="0"/>
-                        <a:t>A2</a:t>
-                      </a:r>
-                      <a:endParaRPr lang="en-US" sz="1200" b="1" dirty="0"/>
-                    </a:p>
-                  </a:txBody>
-                  <a:tcPr/>
-                </a:tc>
-                <a:tc>
-                  <a:txBody>
-                    <a:bodyPr/>
-                    <a:lstStyle/>
-                    <a:p>
-                      <a:pPr algn="ctr"/>
-                      <a:r>
-                        <a:rPr lang="en-US" sz="1200" b="1" dirty="0" smtClean="0"/>
-                        <a:t>A3</a:t>
-                      </a:r>
-                      <a:endParaRPr lang="en-US" sz="1200" b="1" dirty="0"/>
-                    </a:p>
-                  </a:txBody>
-                  <a:tcPr/>
-                </a:tc>
-                <a:tc rowSpan="2">
-                  <a:txBody>
-                    <a:bodyPr/>
-                    <a:lstStyle/>
-                    <a:p>
-                      <a:pPr algn="ctr"/>
-                      <a:r>
-                        <a:rPr lang="en-US" sz="1200" dirty="0" smtClean="0"/>
-                        <a:t>On</a:t>
-                      </a:r>
-                      <a:endParaRPr lang="en-US" sz="1200" dirty="0"/>
-                    </a:p>
-                  </a:txBody>
-                  <a:tcPr anchor="ctr"/>
-                </a:tc>
-                <a:tc rowSpan="2">
-                  <a:txBody>
-                    <a:bodyPr/>
-                    <a:lstStyle/>
-                    <a:p>
-                      <a:pPr algn="ctr"/>
-                      <a:r>
-                        <a:rPr lang="en-US" sz="1200" dirty="0" smtClean="0"/>
-                        <a:t>On</a:t>
-                      </a:r>
-                      <a:endParaRPr lang="en-US" sz="1200" dirty="0"/>
-                    </a:p>
-                  </a:txBody>
-                  <a:tcPr anchor="ctr"/>
-                </a:tc>
-              </a:tr>
-              <a:tr h="170261">
-                <a:tc>
-                  <a:txBody>
-                    <a:bodyPr/>
-                    <a:lstStyle/>
-                    <a:p>
-                      <a:pPr algn="ctr"/>
-                      <a:r>
-                        <a:rPr lang="en-US" sz="1100" dirty="0" smtClean="0"/>
-                        <a:t>Octaves</a:t>
-                      </a:r>
-                      <a:endParaRPr lang="en-US" sz="1100" dirty="0"/>
-                    </a:p>
-                  </a:txBody>
-                  <a:tcPr/>
-                </a:tc>
-                <a:tc>
-                  <a:txBody>
-                    <a:bodyPr/>
-                    <a:lstStyle/>
-                    <a:p>
-                      <a:pPr algn="ctr"/>
-                      <a:r>
-                        <a:rPr lang="en-US" sz="1100" dirty="0" smtClean="0"/>
-                        <a:t>Scale</a:t>
-                      </a:r>
-                      <a:endParaRPr lang="en-US" sz="1100" dirty="0"/>
-                    </a:p>
-                  </a:txBody>
-                  <a:tcPr/>
-                </a:tc>
-                <a:tc vMerge="1">
-                  <a:txBody>
-                    <a:bodyPr/>
-                    <a:lstStyle/>
-                    <a:p>
-                      <a:endParaRPr lang="en-US" sz="1400" dirty="0"/>
-                    </a:p>
-                  </a:txBody>
-                  <a:tcPr/>
-                </a:tc>
-                <a:tc vMerge="1">
-                  <a:txBody>
-                    <a:bodyPr/>
-                    <a:lstStyle/>
-                    <a:p>
-                      <a:endParaRPr lang="en-US" sz="1400" dirty="0"/>
-                    </a:p>
-                  </a:txBody>
-                  <a:tcPr/>
-                </a:tc>
-              </a:tr>
-            </a:tbl>
-          </a:graphicData>
-        </a:graphic>
-      </p:graphicFrame>
-      <p:graphicFrame>
-        <p:nvGraphicFramePr>
-          <p:cNvPr id="8" name="Table 7"/>
-          <p:cNvGraphicFramePr>
-            <a:graphicFrameLocks noGrp="1"/>
-          </p:cNvGraphicFramePr>
-          <p:nvPr>
-            <p:extLst>
-              <p:ext uri="{D42A27DB-BD31-4B8C-83A1-F6EECF244321}">
-                <p14:modId xmlns:p14="http://schemas.microsoft.com/office/powerpoint/2010/main" val="3151568599"/>
-              </p:ext>
-            </p:extLst>
-          </p:nvPr>
-        </p:nvGraphicFramePr>
-        <p:xfrm>
-          <a:off x="4152486" y="4393021"/>
-          <a:ext cx="2649693" cy="1066800"/>
-        </p:xfrm>
-        <a:graphic>
-          <a:graphicData uri="http://schemas.openxmlformats.org/drawingml/2006/table">
-            <a:tbl>
-              <a:tblPr>
-                <a:tableStyleId>{3C2FFA5D-87B4-456A-9821-1D502468CF0F}</a:tableStyleId>
-              </a:tblPr>
-              <a:tblGrid>
-                <a:gridCol w="824833"/>
-                <a:gridCol w="800377"/>
-                <a:gridCol w="522913"/>
-                <a:gridCol w="501570"/>
-              </a:tblGrid>
-              <a:tr h="121615">
-                <a:tc>
-                  <a:txBody>
-                    <a:bodyPr/>
-                    <a:lstStyle/>
-                    <a:p>
-                      <a:pPr algn="ctr"/>
-                      <a:r>
-                        <a:rPr lang="en-US" sz="1200" b="1" dirty="0" smtClean="0"/>
-                        <a:t>A0</a:t>
-                      </a:r>
-                      <a:endParaRPr lang="en-US" sz="1200" b="1" dirty="0"/>
-                    </a:p>
-                  </a:txBody>
-                  <a:tcPr/>
-                </a:tc>
-                <a:tc>
-                  <a:txBody>
-                    <a:bodyPr/>
-                    <a:lstStyle/>
-                    <a:p>
-                      <a:pPr algn="ctr"/>
-                      <a:r>
-                        <a:rPr lang="en-US" sz="1200" b="1" dirty="0" smtClean="0"/>
-                        <a:t>A1</a:t>
-                      </a:r>
-                      <a:endParaRPr lang="en-US" sz="1200" b="1" dirty="0"/>
-                    </a:p>
-                  </a:txBody>
-                  <a:tcPr/>
-                </a:tc>
-                <a:tc rowSpan="2">
-                  <a:txBody>
-                    <a:bodyPr/>
-                    <a:lstStyle/>
-                    <a:p>
-                      <a:pPr algn="ctr"/>
-                      <a:r>
-                        <a:rPr lang="en-US" sz="1200" b="1" dirty="0" smtClean="0"/>
-                        <a:t>D0</a:t>
-                      </a:r>
-                      <a:endParaRPr lang="en-US" sz="1200" b="1" dirty="0"/>
-                    </a:p>
-                  </a:txBody>
-                  <a:tcPr anchor="ctr"/>
-                </a:tc>
-                <a:tc rowSpan="2">
-                  <a:txBody>
-                    <a:bodyPr/>
-                    <a:lstStyle/>
-                    <a:p>
-                      <a:pPr algn="ctr"/>
-                      <a:r>
-                        <a:rPr lang="en-US" sz="1200" b="1" dirty="0" smtClean="0"/>
-                        <a:t>D1</a:t>
-                      </a:r>
-                      <a:endParaRPr lang="en-US" sz="1200" b="1" dirty="0"/>
-                    </a:p>
-                  </a:txBody>
-                  <a:tcPr anchor="ctr"/>
-                </a:tc>
-              </a:tr>
-              <a:tr h="121615">
-                <a:tc>
-                  <a:txBody>
-                    <a:bodyPr/>
-                    <a:lstStyle/>
-                    <a:p>
-                      <a:pPr algn="ctr"/>
-                      <a:r>
-                        <a:rPr lang="en-US" sz="1100" dirty="0" smtClean="0"/>
-                        <a:t>Octaves</a:t>
-                      </a:r>
-                      <a:endParaRPr lang="en-US" sz="1100" dirty="0"/>
-                    </a:p>
-                  </a:txBody>
-                  <a:tcPr/>
-                </a:tc>
-                <a:tc>
-                  <a:txBody>
-                    <a:bodyPr/>
-                    <a:lstStyle/>
-                    <a:p>
-                      <a:pPr algn="ctr"/>
-                      <a:r>
-                        <a:rPr lang="en-US" sz="1100" dirty="0" smtClean="0"/>
-                        <a:t>Scale</a:t>
-                      </a:r>
-                      <a:endParaRPr lang="en-US" sz="1100" dirty="0"/>
-                    </a:p>
-                  </a:txBody>
-                  <a:tcPr/>
-                </a:tc>
-                <a:tc vMerge="1">
-                  <a:txBody>
-                    <a:bodyPr/>
-                    <a:lstStyle/>
-                    <a:p>
-                      <a:endParaRPr lang="en-US" sz="1400" dirty="0"/>
-                    </a:p>
-                  </a:txBody>
-                  <a:tcPr/>
-                </a:tc>
-                <a:tc vMerge="1">
-                  <a:txBody>
-                    <a:bodyPr/>
-                    <a:lstStyle/>
-                    <a:p>
-                      <a:endParaRPr lang="en-US" sz="1400" dirty="0"/>
-                    </a:p>
-                  </a:txBody>
-                  <a:tcPr/>
-                </a:tc>
-              </a:tr>
-              <a:tr h="121615">
-                <a:tc>
-                  <a:txBody>
-                    <a:bodyPr/>
-                    <a:lstStyle/>
-                    <a:p>
-                      <a:pPr algn="ctr"/>
-                      <a:r>
-                        <a:rPr lang="en-US" sz="1200" b="1" dirty="0" smtClean="0"/>
-                        <a:t>A2</a:t>
-                      </a:r>
-                      <a:endParaRPr lang="en-US" sz="1200" b="1" dirty="0"/>
-                    </a:p>
-                  </a:txBody>
-                  <a:tcPr/>
-                </a:tc>
-                <a:tc>
-                  <a:txBody>
-                    <a:bodyPr/>
-                    <a:lstStyle/>
-                    <a:p>
-                      <a:pPr algn="ctr"/>
-                      <a:r>
-                        <a:rPr lang="en-US" sz="1200" b="1" dirty="0" smtClean="0"/>
-                        <a:t>A3</a:t>
-                      </a:r>
-                      <a:endParaRPr lang="en-US" sz="1200" b="1" dirty="0"/>
-                    </a:p>
-                  </a:txBody>
-                  <a:tcPr/>
-                </a:tc>
-                <a:tc rowSpan="2">
-                  <a:txBody>
-                    <a:bodyPr/>
-                    <a:lstStyle/>
-                    <a:p>
-                      <a:pPr algn="ctr"/>
-                      <a:r>
-                        <a:rPr lang="en-US" sz="1200" dirty="0" smtClean="0"/>
-                        <a:t>On</a:t>
-                      </a:r>
-                      <a:endParaRPr lang="en-US" sz="1200" dirty="0"/>
-                    </a:p>
-                  </a:txBody>
-                  <a:tcPr anchor="ctr"/>
-                </a:tc>
-                <a:tc rowSpan="2">
-                  <a:txBody>
-                    <a:bodyPr/>
-                    <a:lstStyle/>
-                    <a:p>
-                      <a:pPr algn="ctr"/>
-                      <a:endParaRPr lang="en-US" sz="1200" dirty="0"/>
-                    </a:p>
-                  </a:txBody>
-                  <a:tcPr anchor="ctr"/>
-                </a:tc>
-              </a:tr>
-              <a:tr h="170261">
-                <a:tc>
-                  <a:txBody>
-                    <a:bodyPr/>
-                    <a:lstStyle/>
-                    <a:p>
-                      <a:pPr algn="ctr"/>
-                      <a:r>
-                        <a:rPr lang="en-US" sz="1100" dirty="0" smtClean="0"/>
-                        <a:t>Steps / </a:t>
-                      </a:r>
-                      <a:r>
-                        <a:rPr lang="en-US" sz="1100" dirty="0" err="1" smtClean="0"/>
-                        <a:t>Dist</a:t>
-                      </a:r>
-                      <a:endParaRPr lang="en-US" sz="1100" dirty="0"/>
-                    </a:p>
-                  </a:txBody>
-                  <a:tcPr/>
-                </a:tc>
-                <a:tc>
-                  <a:txBody>
-                    <a:bodyPr/>
-                    <a:lstStyle/>
-                    <a:p>
-                      <a:pPr algn="ctr"/>
-                      <a:r>
-                        <a:rPr lang="en-US" sz="1100" dirty="0" smtClean="0"/>
-                        <a:t>Mode</a:t>
-                      </a:r>
-                      <a:endParaRPr lang="en-US" sz="1100" dirty="0"/>
-                    </a:p>
-                  </a:txBody>
-                  <a:tcPr/>
-                </a:tc>
-                <a:tc vMerge="1">
-                  <a:txBody>
-                    <a:bodyPr/>
-                    <a:lstStyle/>
-                    <a:p>
-                      <a:endParaRPr lang="en-US" sz="1400" dirty="0"/>
-                    </a:p>
-                  </a:txBody>
-                  <a:tcPr/>
-                </a:tc>
-                <a:tc vMerge="1">
-                  <a:txBody>
-                    <a:bodyPr/>
-                    <a:lstStyle/>
-                    <a:p>
-                      <a:endParaRPr lang="en-US" sz="1400" dirty="0"/>
-                    </a:p>
-                  </a:txBody>
-                  <a:tcPr/>
-                </a:tc>
-              </a:tr>
-            </a:tbl>
-          </a:graphicData>
-        </a:graphic>
-      </p:graphicFrame>
-      <p:graphicFrame>
-        <p:nvGraphicFramePr>
-          <p:cNvPr id="9" name="Table 8"/>
-          <p:cNvGraphicFramePr>
-            <a:graphicFrameLocks noGrp="1"/>
-          </p:cNvGraphicFramePr>
-          <p:nvPr>
-            <p:extLst>
-              <p:ext uri="{D42A27DB-BD31-4B8C-83A1-F6EECF244321}">
-                <p14:modId xmlns:p14="http://schemas.microsoft.com/office/powerpoint/2010/main" val="1421665213"/>
-              </p:ext>
-            </p:extLst>
-          </p:nvPr>
-        </p:nvGraphicFramePr>
-        <p:xfrm>
-          <a:off x="4152486" y="3217815"/>
-          <a:ext cx="2649693" cy="1082040"/>
-        </p:xfrm>
-        <a:graphic>
-          <a:graphicData uri="http://schemas.openxmlformats.org/drawingml/2006/table">
-            <a:tbl>
-              <a:tblPr>
-                <a:tableStyleId>{3C2FFA5D-87B4-456A-9821-1D502468CF0F}</a:tableStyleId>
-              </a:tblPr>
-              <a:tblGrid>
-                <a:gridCol w="824833"/>
-                <a:gridCol w="800377"/>
-                <a:gridCol w="522913"/>
-                <a:gridCol w="501570"/>
-              </a:tblGrid>
-              <a:tr h="266700">
-                <a:tc>
-                  <a:txBody>
-                    <a:bodyPr/>
-                    <a:lstStyle/>
-                    <a:p>
-                      <a:pPr algn="ctr"/>
-                      <a:r>
-                        <a:rPr lang="en-US" sz="1200" b="1" dirty="0" smtClean="0"/>
-                        <a:t>A0</a:t>
-                      </a:r>
-                      <a:endParaRPr lang="en-US" sz="1200" b="1" dirty="0"/>
-                    </a:p>
-                  </a:txBody>
-                  <a:tcPr/>
-                </a:tc>
-                <a:tc>
-                  <a:txBody>
-                    <a:bodyPr/>
-                    <a:lstStyle/>
-                    <a:p>
-                      <a:pPr algn="ctr"/>
-                      <a:r>
-                        <a:rPr lang="en-US" sz="1200" b="1" dirty="0" smtClean="0"/>
-                        <a:t>A1</a:t>
-                      </a:r>
-                      <a:endParaRPr lang="en-US" sz="1200" b="1" dirty="0"/>
-                    </a:p>
-                  </a:txBody>
-                  <a:tcPr/>
-                </a:tc>
-                <a:tc gridSpan="2">
-                  <a:txBody>
-                    <a:bodyPr/>
-                    <a:lstStyle/>
-                    <a:p>
-                      <a:pPr algn="ctr"/>
-                      <a:r>
-                        <a:rPr lang="en-US" sz="1200" b="1" i="1" dirty="0" smtClean="0"/>
-                        <a:t>Default</a:t>
-                      </a:r>
-                      <a:endParaRPr lang="en-US" sz="1100" b="1" i="1" dirty="0"/>
-                    </a:p>
-                  </a:txBody>
-                  <a:tcPr anchor="ctr"/>
-                </a:tc>
-                <a:tc hMerge="1">
-                  <a:txBody>
-                    <a:bodyPr/>
-                    <a:lstStyle/>
-                    <a:p>
-                      <a:endParaRPr lang="en-US" dirty="0"/>
-                    </a:p>
-                  </a:txBody>
-                  <a:tcPr anchor="ctr"/>
-                </a:tc>
-              </a:tr>
-              <a:tr h="121615">
-                <a:tc>
-                  <a:txBody>
-                    <a:bodyPr/>
-                    <a:lstStyle/>
-                    <a:p>
-                      <a:pPr algn="ctr"/>
-                      <a:r>
-                        <a:rPr lang="en-US" sz="1100" dirty="0" smtClean="0"/>
-                        <a:t>Mode</a:t>
-                      </a:r>
-                      <a:endParaRPr lang="en-US" sz="1100" dirty="0"/>
-                    </a:p>
-                  </a:txBody>
-                  <a:tcPr/>
-                </a:tc>
-                <a:tc>
-                  <a:txBody>
-                    <a:bodyPr/>
-                    <a:lstStyle/>
-                    <a:p>
-                      <a:pPr algn="ctr"/>
-                      <a:r>
-                        <a:rPr lang="en-US" sz="1100" dirty="0" smtClean="0"/>
-                        <a:t>Scale</a:t>
-                      </a:r>
-                      <a:endParaRPr lang="en-US" sz="1100" dirty="0"/>
-                    </a:p>
-                  </a:txBody>
-                  <a:tcPr/>
-                </a:tc>
-                <a:tc>
-                  <a:txBody>
-                    <a:bodyPr/>
-                    <a:lstStyle/>
-                    <a:p>
-                      <a:pPr algn="ctr"/>
-                      <a:r>
-                        <a:rPr lang="en-US" sz="1200" b="1" dirty="0" smtClean="0"/>
-                        <a:t>D0</a:t>
-                      </a:r>
-                      <a:endParaRPr lang="en-US" sz="1200" b="1" dirty="0"/>
-                    </a:p>
-                  </a:txBody>
-                  <a:tcPr anchor="ctr"/>
-                </a:tc>
-                <a:tc>
-                  <a:txBody>
-                    <a:bodyPr/>
-                    <a:lstStyle/>
-                    <a:p>
-                      <a:pPr algn="ctr"/>
-                      <a:r>
-                        <a:rPr lang="en-US" sz="1200" b="1" dirty="0" smtClean="0"/>
-                        <a:t>D1</a:t>
-                      </a:r>
-                      <a:endParaRPr lang="en-US" sz="1200" b="1" dirty="0"/>
-                    </a:p>
-                  </a:txBody>
-                  <a:tcPr anchor="ctr"/>
-                </a:tc>
-              </a:tr>
-              <a:tr h="121615">
-                <a:tc>
-                  <a:txBody>
-                    <a:bodyPr/>
-                    <a:lstStyle/>
-                    <a:p>
-                      <a:pPr algn="ctr"/>
-                      <a:r>
-                        <a:rPr lang="en-US" sz="1200" b="1" dirty="0" smtClean="0"/>
-                        <a:t>A2</a:t>
-                      </a:r>
-                      <a:endParaRPr lang="en-US" sz="1200" b="1" dirty="0"/>
-                    </a:p>
-                  </a:txBody>
-                  <a:tcPr/>
-                </a:tc>
-                <a:tc>
-                  <a:txBody>
-                    <a:bodyPr/>
-                    <a:lstStyle/>
-                    <a:p>
-                      <a:pPr algn="ctr"/>
-                      <a:r>
-                        <a:rPr lang="en-US" sz="1200" b="1" dirty="0" smtClean="0"/>
-                        <a:t>A3</a:t>
-                      </a:r>
-                      <a:endParaRPr lang="en-US" sz="1200" b="1" dirty="0"/>
-                    </a:p>
-                  </a:txBody>
-                  <a:tcPr/>
-                </a:tc>
-                <a:tc rowSpan="2">
-                  <a:txBody>
-                    <a:bodyPr/>
-                    <a:lstStyle/>
-                    <a:p>
-                      <a:pPr algn="ctr"/>
-                      <a:endParaRPr lang="en-US" sz="1200" dirty="0"/>
-                    </a:p>
-                  </a:txBody>
-                  <a:tcPr anchor="ctr"/>
-                </a:tc>
-                <a:tc rowSpan="2">
-                  <a:txBody>
-                    <a:bodyPr/>
-                    <a:lstStyle/>
-                    <a:p>
-                      <a:pPr algn="ctr"/>
-                      <a:endParaRPr lang="en-US" sz="1200" dirty="0"/>
-                    </a:p>
-                  </a:txBody>
-                  <a:tcPr anchor="ctr"/>
-                </a:tc>
-              </a:tr>
-              <a:tr h="170261">
-                <a:tc>
-                  <a:txBody>
-                    <a:bodyPr/>
-                    <a:lstStyle/>
-                    <a:p>
-                      <a:pPr algn="ctr"/>
-                      <a:r>
-                        <a:rPr lang="en-US" sz="1100" dirty="0" smtClean="0"/>
-                        <a:t>Steps / </a:t>
-                      </a:r>
-                      <a:r>
-                        <a:rPr lang="en-US" sz="1100" dirty="0" err="1" smtClean="0"/>
-                        <a:t>Dist</a:t>
-                      </a:r>
-                      <a:endParaRPr lang="en-US" sz="1100" dirty="0"/>
-                    </a:p>
-                  </a:txBody>
-                  <a:tcPr/>
-                </a:tc>
-                <a:tc>
-                  <a:txBody>
-                    <a:bodyPr/>
-                    <a:lstStyle/>
-                    <a:p>
-                      <a:pPr algn="ctr"/>
-                      <a:r>
-                        <a:rPr lang="en-US" sz="1100" dirty="0" smtClean="0"/>
-                        <a:t>Octaves</a:t>
-                      </a:r>
-                      <a:endParaRPr lang="en-US" sz="1100" dirty="0"/>
-                    </a:p>
-                  </a:txBody>
-                  <a:tcPr/>
-                </a:tc>
-                <a:tc vMerge="1">
-                  <a:txBody>
-                    <a:bodyPr/>
-                    <a:lstStyle/>
-                    <a:p>
-                      <a:endParaRPr lang="en-US" sz="1400" dirty="0"/>
-                    </a:p>
-                  </a:txBody>
-                  <a:tcPr/>
-                </a:tc>
-                <a:tc vMerge="1">
-                  <a:txBody>
-                    <a:bodyPr/>
-                    <a:lstStyle/>
-                    <a:p>
-                      <a:endParaRPr lang="en-US" sz="1400" dirty="0"/>
-                    </a:p>
-                  </a:txBody>
-                  <a:tcPr/>
-                </a:tc>
-              </a:tr>
-            </a:tbl>
-          </a:graphicData>
-        </a:graphic>
-      </p:graphicFrame>
       <p:sp>
         <p:nvSpPr>
           <p:cNvPr id="10" name="TextBox 9"/>
@@ -4728,8 +3362,8 @@
         </p:nvSpPr>
         <p:spPr>
           <a:xfrm>
-            <a:off x="4152486" y="478566"/>
-            <a:ext cx="5558756" cy="2673555"/>
+            <a:off x="6608683" y="544260"/>
+            <a:ext cx="3113508" cy="3399739"/>
           </a:xfrm>
           <a:prstGeom prst="rect">
             <a:avLst/>
@@ -4743,97 +3377,63 @@
           <a:lstStyle/>
           <a:p>
             <a:r>
+              <a:rPr lang="en-US" sz="1100" b="1" dirty="0" smtClean="0"/>
+              <a:t>Control Mode - Layouts</a:t>
+            </a:r>
+            <a:endParaRPr lang="en-US" sz="1100" b="1" dirty="0" smtClean="0"/>
+          </a:p>
+          <a:p>
+            <a:endParaRPr lang="en-US" sz="1100" dirty="0" smtClean="0"/>
+          </a:p>
+          <a:p>
+            <a:r>
               <a:rPr lang="en-US" sz="1100" dirty="0" smtClean="0"/>
-              <a:t>The </a:t>
-            </a:r>
-            <a:r>
-              <a:rPr lang="en-US" sz="1100" dirty="0" err="1" smtClean="0"/>
-              <a:t>arpeggiator</a:t>
+              <a:t>Control mode allows you to select which </a:t>
             </a:r>
             <a:r>
               <a:rPr lang="en-US" sz="1100" dirty="0" smtClean="0"/>
-              <a:t> will play 5 octaves of notes. If an </a:t>
-            </a:r>
-            <a:r>
-              <a:rPr lang="en-US" sz="1100" dirty="0" err="1" smtClean="0"/>
-              <a:t>apreggio</a:t>
+              <a:t>parameters are </a:t>
+            </a:r>
+            <a:r>
+              <a:rPr lang="en-US" sz="1100" dirty="0" smtClean="0"/>
+              <a:t>assigned to which of the analog inputs, and therefore which </a:t>
+            </a:r>
+            <a:r>
+              <a:rPr lang="en-US" sz="1100" dirty="0" smtClean="0"/>
+              <a:t>parameters you </a:t>
+            </a:r>
+            <a:r>
+              <a:rPr lang="en-US" sz="1100" dirty="0" smtClean="0"/>
+              <a:t>can use CV to control, and which are manual only.</a:t>
+            </a:r>
+          </a:p>
+          <a:p>
+            <a:endParaRPr lang="en-US" sz="1100" dirty="0"/>
+          </a:p>
+          <a:p>
+            <a:r>
+              <a:rPr lang="en-US" sz="1100" dirty="0" smtClean="0"/>
+              <a:t>To </a:t>
+            </a:r>
+            <a:r>
+              <a:rPr lang="en-US" sz="1100" smtClean="0"/>
+              <a:t>enter </a:t>
+            </a:r>
+            <a:r>
+              <a:rPr lang="en-US" sz="1100" smtClean="0"/>
+              <a:t>control </a:t>
             </a:r>
             <a:r>
               <a:rPr lang="en-US" sz="1100" dirty="0"/>
-              <a:t> </a:t>
+              <a:t>m</a:t>
+            </a:r>
+            <a:r>
+              <a:rPr lang="en-US" sz="1100" smtClean="0"/>
+              <a:t>ode</a:t>
             </a:r>
             <a:r>
               <a:rPr lang="en-US" sz="1100" dirty="0" smtClean="0"/>
-              <a:t>tries to play above this, we drop the remainder of it 5 octaves, then continue to play from that level.</a:t>
-            </a:r>
-            <a:endParaRPr lang="en-US" sz="1100" dirty="0" smtClean="0"/>
-          </a:p>
-          <a:p>
-            <a:endParaRPr lang="en-US" sz="1100" b="1" u="sng" dirty="0"/>
-          </a:p>
-          <a:p>
-            <a:r>
-              <a:rPr lang="en-US" sz="1100" b="1" u="sng" dirty="0" smtClean="0"/>
-              <a:t>Outputs</a:t>
-            </a:r>
-            <a:endParaRPr lang="en-US" sz="1100" b="1" u="sng" dirty="0" smtClean="0"/>
-          </a:p>
-          <a:p>
-            <a:endParaRPr lang="en-US" sz="1100" b="1" u="sng" dirty="0"/>
-          </a:p>
-          <a:p>
-            <a:r>
-              <a:rPr lang="en-US" sz="1100" dirty="0"/>
-              <a:t>DAC output gives the 1V/Oct output to send to your oscillator.</a:t>
-            </a:r>
-          </a:p>
-          <a:p>
-            <a:r>
-              <a:rPr lang="en-US" sz="1100" dirty="0"/>
-              <a:t>D0 triggers every time the entire arpeggio sequence starts </a:t>
-            </a:r>
-            <a:r>
-              <a:rPr lang="en-US" sz="1100" dirty="0" smtClean="0"/>
-              <a:t>again</a:t>
-            </a:r>
-            <a:endParaRPr lang="en-US" sz="1100" dirty="0"/>
-          </a:p>
-          <a:p>
-            <a:r>
-              <a:rPr lang="en-US" sz="1100" dirty="0"/>
-              <a:t>D1 triggers every time the arpeggio changes octave</a:t>
-            </a:r>
-            <a:r>
-              <a:rPr lang="en-US" sz="1100" dirty="0" smtClean="0"/>
-              <a:t>.</a:t>
-            </a:r>
-            <a:endParaRPr lang="en-US" sz="1100" dirty="0"/>
-          </a:p>
-          <a:p>
-            <a:endParaRPr lang="en-US" sz="1100" b="1" u="sng" dirty="0" smtClean="0"/>
-          </a:p>
-          <a:p>
-            <a:r>
-              <a:rPr lang="en-US" sz="1100" b="1" u="sng" dirty="0" smtClean="0"/>
-              <a:t>Control Mode</a:t>
-            </a:r>
-          </a:p>
-          <a:p>
-            <a:endParaRPr lang="en-US" sz="1100" dirty="0" smtClean="0"/>
-          </a:p>
-          <a:p>
-            <a:r>
-              <a:rPr lang="en-US" sz="1100" dirty="0" smtClean="0"/>
-              <a:t>Control mode allows you to select which controls are assigned to which of the analog inputs, and therefore which controls you can use CV to control, and which are manual only.</a:t>
-            </a:r>
-          </a:p>
-          <a:p>
-            <a:endParaRPr lang="en-US" sz="1100" dirty="0"/>
-          </a:p>
-          <a:p>
-            <a:r>
-              <a:rPr lang="en-US" sz="1100" dirty="0" smtClean="0"/>
-              <a:t>To enter Control Mode, turn the </a:t>
+              <a:t>, turn the </a:t>
             </a:r>
             <a:r>
               <a:rPr lang="en-US" sz="1100" dirty="0" smtClean="0"/>
@@ -4847,19 +3447,31 @@
           <a:p>
             <a:r>
               <a:rPr lang="en-US" sz="1100" dirty="0" smtClean="0"/>
-              <a:t>Then use the A2 control to select the layout you want (all variations detailed below).</a:t>
-            </a:r>
-          </a:p>
-          <a:p>
+              <a:t>Then use the A2 control to select the layout you want (all variations detailed below)</a:t>
+            </a:r>
             <a:r>
               <a:rPr lang="en-US" sz="1100" dirty="0" smtClean="0"/>
-              <a:t>The status of the two LEDs shows which layout you have selected.</a:t>
-            </a:r>
-          </a:p>
-          <a:p>
+              <a:t>. The </a:t>
+            </a:r>
             <a:r>
               <a:rPr lang="en-US" sz="1100" dirty="0" smtClean="0"/>
-              <a:t>Once you’ve selected your layout, turn down control A3 to return to normal operation.</a:t>
+              <a:t>status of the two LEDs shows which layout you have </a:t>
+            </a:r>
+            <a:r>
+              <a:rPr lang="en-US" sz="1100" dirty="0" smtClean="0"/>
+              <a:t>selected. Once </a:t>
+            </a:r>
+            <a:r>
+              <a:rPr lang="en-US" sz="1100" dirty="0" smtClean="0"/>
+              <a:t>you’ve selected your layout, turn down control A3 to </a:t>
+            </a:r>
+            <a:r>
+              <a:rPr lang="en-US" sz="1100" dirty="0" smtClean="0"/>
+              <a:t>exit control mode and return </a:t>
+            </a:r>
+            <a:r>
+              <a:rPr lang="en-US" sz="1100" dirty="0" smtClean="0"/>
+              <a:t>to normal operation.</a:t>
             </a:r>
           </a:p>
           <a:p>
@@ -4897,6 +3509,61 @@
             <a:r>
               <a:rPr lang="en-US" sz="1100" dirty="0" smtClean="0"/>
               <a:t>switches, although this is non-trivial, and needs a VC switch (with 2 inputs on each) for each of the 4 knobs to be completely effective.</a:t>
+            </a:r>
+          </a:p>
+          <a:p>
+            <a:endParaRPr lang="en-US" sz="1100" dirty="0"/>
+          </a:p>
+          <a:p>
+            <a:r>
+              <a:rPr lang="en-US" sz="1100" b="1" dirty="0"/>
+              <a:t>Control Mode </a:t>
+            </a:r>
+            <a:r>
+              <a:rPr lang="en-US" sz="1100" b="1" dirty="0" smtClean="0"/>
+              <a:t>– Octaves / Root</a:t>
+            </a:r>
+            <a:endParaRPr lang="en-US" sz="1100" b="1" dirty="0"/>
+          </a:p>
+          <a:p>
+            <a:endParaRPr lang="en-US" sz="1100" dirty="0"/>
+          </a:p>
+          <a:p>
+            <a:r>
+              <a:rPr lang="en-US" sz="1100" dirty="0" smtClean="0"/>
+              <a:t>When in control mode, A0 will set the function that the O/R control will perform. When the selection is changed,  D0 will flash from 1 to 3 times to indicate which option is selected.</a:t>
+            </a:r>
+          </a:p>
+          <a:p>
+            <a:r>
+              <a:rPr lang="en-US" sz="1100" dirty="0" smtClean="0"/>
+              <a:t>When </a:t>
+            </a:r>
+            <a:r>
+              <a:rPr lang="en-US" sz="1100" dirty="0"/>
+              <a:t>the O/R control is set to control the root </a:t>
+            </a:r>
+            <a:r>
+              <a:rPr lang="en-US" sz="1100" dirty="0" smtClean="0"/>
+              <a:t>note, the </a:t>
+            </a:r>
+            <a:r>
+              <a:rPr lang="en-US" sz="1100" dirty="0" smtClean="0"/>
+              <a:t>default number of octaves to be used for the arpeggio can be set in control mode using A1. Feedback on the number of octaves selected is provided through flashes of D1.</a:t>
+            </a:r>
+          </a:p>
+          <a:p>
+            <a:r>
+              <a:rPr lang="en-US" sz="1100" dirty="0" smtClean="0"/>
+              <a:t>When </a:t>
+            </a:r>
+            <a:r>
+              <a:rPr lang="en-US" sz="1100" dirty="0" err="1" smtClean="0"/>
+              <a:t>arpeggiating</a:t>
+            </a:r>
+            <a:r>
+              <a:rPr lang="en-US" sz="1100" dirty="0" smtClean="0"/>
+              <a:t> in “both” mode, the O/R control should be set using a discrete CV, rather than continuous CV or manually, to avoid unintentional change of values by the control sweeping over the changeover point between the two parameters.</a:t>
             </a:r>
             <a:endParaRPr lang="en-US" sz="1100" dirty="0"/>
           </a:p>
@@ -4911,14 +3578,14 @@
           <p:nvPr>
             <p:extLst>
               <p:ext uri="{D42A27DB-BD31-4B8C-83A1-F6EECF244321}">
-                <p14:modId xmlns:p14="http://schemas.microsoft.com/office/powerpoint/2010/main" val="4271889668"/>
+                <p14:modId xmlns:p14="http://schemas.microsoft.com/office/powerpoint/2010/main" val="3929984813"/>
               </p:ext>
             </p:extLst>
           </p:nvPr>
         </p:nvGraphicFramePr>
         <p:xfrm>
-          <a:off x="242337" y="202750"/>
-          <a:ext cx="3695518" cy="2499359"/>
+          <a:off x="209490" y="268444"/>
+          <a:ext cx="3469334" cy="2362199"/>
         </p:xfrm>
         <a:graphic>
           <a:graphicData uri="http://schemas.openxmlformats.org/drawingml/2006/table">
@@ -4927,8 +3594,8 @@
                 <a:tableStyleId>{3C2FFA5D-87B4-456A-9821-1D502468CF0F}</a:tableStyleId>
               </a:tblPr>
               <a:tblGrid>
-                <a:gridCol w="789629"/>
-                <a:gridCol w="2905889"/>
+                <a:gridCol w="741300"/>
+                <a:gridCol w="2728034"/>
               </a:tblGrid>
               <a:tr h="219698">
                 <a:tc gridSpan="2">
@@ -4965,10 +3632,10 @@
                     <a:p>
                       <a:pPr algn="ctr"/>
                       <a:r>
-                        <a:rPr lang="en-US" sz="1200" b="1" dirty="0" smtClean="0"/>
+                        <a:rPr lang="en-US" sz="1100" b="1" dirty="0" smtClean="0"/>
                         <a:t>Up</a:t>
                       </a:r>
-                      <a:endParaRPr lang="en-US" sz="1200" b="1" dirty="0"/>
+                      <a:endParaRPr lang="en-US" sz="1100" b="1" dirty="0"/>
                     </a:p>
                   </a:txBody>
                   <a:tcPr anchor="ctr"/>
@@ -4979,14 +3646,14 @@
                     <a:lstStyle/>
                     <a:p>
                       <a:r>
-                        <a:rPr lang="en-US" sz="1200" dirty="0" smtClean="0"/>
+                        <a:rPr lang="en-US" sz="1100" dirty="0" smtClean="0"/>
                         <a:t>Lowest</a:t>
                       </a:r>
                       <a:r>
-                        <a:rPr lang="en-US" sz="1200" baseline="0" dirty="0" smtClean="0"/>
+                        <a:rPr lang="en-US" sz="1100" baseline="0" dirty="0" smtClean="0"/>
                         <a:t> to highest note</a:t>
                       </a:r>
-                      <a:endParaRPr lang="en-US" sz="1200" dirty="0"/>
+                      <a:endParaRPr lang="en-US" sz="1100" dirty="0"/>
                     </a:p>
                   </a:txBody>
                   <a:tcPr anchor="ctr"/>
@@ -5000,10 +3667,10 @@
                     <a:p>
                       <a:pPr algn="ctr"/>
                       <a:r>
-                        <a:rPr lang="en-US" sz="1200" b="1" dirty="0" smtClean="0"/>
+                        <a:rPr lang="en-US" sz="1100" b="1" dirty="0" smtClean="0"/>
                         <a:t>Down</a:t>
                       </a:r>
-                      <a:endParaRPr lang="en-US" sz="1200" b="1" dirty="0"/>
+                      <a:endParaRPr lang="en-US" sz="1100" b="1" dirty="0"/>
                     </a:p>
                   </a:txBody>
                   <a:tcPr anchor="ctr"/>
@@ -5014,10 +3681,10 @@
                     <a:lstStyle/>
                     <a:p>
                       <a:r>
-                        <a:rPr lang="en-US" sz="1200" dirty="0" smtClean="0"/>
+                        <a:rPr lang="en-US" sz="1100" dirty="0" smtClean="0"/>
                         <a:t>Highest to lowest note</a:t>
                       </a:r>
-                      <a:endParaRPr lang="en-US" sz="1200" dirty="0"/>
+                      <a:endParaRPr lang="en-US" sz="1100" dirty="0"/>
                     </a:p>
                   </a:txBody>
                   <a:tcPr anchor="ctr"/>
@@ -5031,10 +3698,10 @@
                     <a:p>
                       <a:pPr algn="ctr"/>
                       <a:r>
-                        <a:rPr lang="en-US" sz="1200" b="1" dirty="0" smtClean="0"/>
+                        <a:rPr lang="en-US" sz="1100" b="1" dirty="0" smtClean="0"/>
                         <a:t>Up/Down</a:t>
                       </a:r>
-                      <a:endParaRPr lang="en-US" sz="1200" b="1" dirty="0"/>
+                      <a:endParaRPr lang="en-US" sz="1100" b="1" dirty="0"/>
                     </a:p>
                   </a:txBody>
                   <a:tcPr anchor="ctr"/>
@@ -5045,26 +3712,26 @@
                     <a:lstStyle/>
                     <a:p>
                       <a:r>
-                        <a:rPr lang="en-US" sz="1200" dirty="0" smtClean="0"/>
+                        <a:rPr lang="en-US" sz="1100" dirty="0" smtClean="0"/>
                         <a:t>Lowest to highest</a:t>
                       </a:r>
                       <a:r>
-                        <a:rPr lang="en-US" sz="1200" baseline="0" dirty="0" smtClean="0"/>
+                        <a:rPr lang="en-US" sz="1100" baseline="0" dirty="0" smtClean="0"/>
                         <a:t> then back; </a:t>
                       </a:r>
                       <a:r>
-                        <a:rPr lang="en-US" sz="1200" baseline="0" dirty="0" err="1" smtClean="0"/>
+                        <a:rPr lang="en-US" sz="1100" baseline="0" dirty="0" err="1" smtClean="0"/>
                         <a:t>doesn</a:t>
                       </a:r>
                       <a:r>
-                        <a:rPr lang="fr-FR" sz="1200" baseline="0" dirty="0" smtClean="0"/>
+                        <a:rPr lang="fr-FR" sz="1100" baseline="0" dirty="0" smtClean="0"/>
                         <a:t>’</a:t>
                       </a:r>
                       <a:r>
-                        <a:rPr lang="en-US" sz="1200" baseline="0" dirty="0" smtClean="0"/>
+                        <a:rPr lang="en-US" sz="1100" baseline="0" dirty="0" smtClean="0"/>
                         <a:t>t repeat highest and lowest notes</a:t>
                       </a:r>
-                      <a:endParaRPr lang="en-US" sz="1200" dirty="0"/>
+                      <a:endParaRPr lang="en-US" sz="1100" dirty="0"/>
                     </a:p>
                   </a:txBody>
                   <a:tcPr anchor="ctr"/>
@@ -5078,10 +3745,10 @@
                     <a:p>
                       <a:pPr algn="ctr"/>
                       <a:r>
-                        <a:rPr lang="en-US" sz="1200" b="1" dirty="0" smtClean="0"/>
+                        <a:rPr lang="en-US" sz="1100" b="1" dirty="0" smtClean="0"/>
                         <a:t>Root-Up</a:t>
                       </a:r>
-                      <a:endParaRPr lang="en-US" sz="1200" b="1" dirty="0"/>
+                      <a:endParaRPr lang="en-US" sz="1100" b="1" dirty="0"/>
                     </a:p>
                   </a:txBody>
                   <a:tcPr anchor="ctr"/>
@@ -5092,14 +3759,14 @@
                     <a:lstStyle/>
                     <a:p>
                       <a:r>
-                        <a:rPr lang="en-US" sz="1200" dirty="0" smtClean="0"/>
+                        <a:rPr lang="en-US" sz="1100" dirty="0" smtClean="0"/>
                         <a:t>Bounce between lowest </a:t>
                       </a:r>
                       <a:r>
-                        <a:rPr lang="en-US" sz="1200" baseline="0" dirty="0" smtClean="0"/>
+                        <a:rPr lang="en-US" sz="1100" baseline="0" dirty="0" smtClean="0"/>
                         <a:t>and each other note in the series</a:t>
                       </a:r>
-                      <a:endParaRPr lang="en-US" sz="1200" dirty="0"/>
+                      <a:endParaRPr lang="en-US" sz="1100" dirty="0"/>
                     </a:p>
                   </a:txBody>
                   <a:tcPr anchor="ctr"/>
@@ -5113,10 +3780,10 @@
                     <a:p>
                       <a:pPr algn="ctr"/>
                       <a:r>
-                        <a:rPr lang="en-US" sz="1200" b="1" dirty="0" smtClean="0"/>
+                        <a:rPr lang="en-US" sz="1100" b="1" dirty="0" smtClean="0"/>
                         <a:t>Ping-Pong</a:t>
                       </a:r>
-                      <a:endParaRPr lang="en-US" sz="1200" b="1" dirty="0"/>
+                      <a:endParaRPr lang="en-US" sz="1100" b="1" dirty="0"/>
                     </a:p>
                   </a:txBody>
                   <a:tcPr anchor="ctr"/>
@@ -5127,14 +3794,14 @@
                     <a:lstStyle/>
                     <a:p>
                       <a:r>
-                        <a:rPr lang="en-US" sz="1200" dirty="0" smtClean="0"/>
+                        <a:rPr lang="en-US" sz="1100" dirty="0" smtClean="0"/>
                         <a:t>Alternate from lowest to highest, moving towards middle note until all</a:t>
                       </a:r>
                       <a:r>
-                        <a:rPr lang="en-US" sz="1200" baseline="0" dirty="0" smtClean="0"/>
+                        <a:rPr lang="en-US" sz="1100" baseline="0" dirty="0" smtClean="0"/>
                         <a:t> are played</a:t>
                       </a:r>
-                      <a:endParaRPr lang="en-US" sz="1200" dirty="0"/>
+                      <a:endParaRPr lang="en-US" sz="1100" dirty="0"/>
                     </a:p>
                   </a:txBody>
                   <a:tcPr anchor="ctr"/>
@@ -5148,10 +3815,10 @@
                     <a:p>
                       <a:pPr algn="ctr"/>
                       <a:r>
-                        <a:rPr lang="en-US" sz="1200" b="1" dirty="0" smtClean="0"/>
+                        <a:rPr lang="en-US" sz="1100" b="1" dirty="0" smtClean="0"/>
                         <a:t>Random</a:t>
                       </a:r>
-                      <a:endParaRPr lang="en-US" sz="1200" b="1" dirty="0"/>
+                      <a:endParaRPr lang="en-US" sz="1100" b="1" dirty="0"/>
                     </a:p>
                   </a:txBody>
                   <a:tcPr anchor="ctr"/>
@@ -5162,10 +3829,10 @@
                     <a:lstStyle/>
                     <a:p>
                       <a:r>
-                        <a:rPr lang="en-US" sz="1200" dirty="0" smtClean="0"/>
+                        <a:rPr lang="en-US" sz="1100" dirty="0" smtClean="0"/>
                         <a:t>Plays one note from each octave selected</a:t>
                       </a:r>
-                      <a:endParaRPr lang="en-US" sz="1200" dirty="0"/>
+                      <a:endParaRPr lang="en-US" sz="1100" dirty="0"/>
                     </a:p>
                   </a:txBody>
                   <a:tcPr anchor="ctr"/>
@@ -5184,14 +3851,14 @@
           <p:nvPr>
             <p:extLst>
               <p:ext uri="{D42A27DB-BD31-4B8C-83A1-F6EECF244321}">
-                <p14:modId xmlns:p14="http://schemas.microsoft.com/office/powerpoint/2010/main" val="3723980835"/>
+                <p14:modId xmlns:p14="http://schemas.microsoft.com/office/powerpoint/2010/main" val="4140799339"/>
               </p:ext>
             </p:extLst>
           </p:nvPr>
         </p:nvGraphicFramePr>
         <p:xfrm>
-          <a:off x="242337" y="3388367"/>
-          <a:ext cx="1422447" cy="3474719"/>
+          <a:off x="209490" y="2900336"/>
+          <a:ext cx="1213864" cy="3474719"/>
         </p:xfrm>
         <a:graphic>
           <a:graphicData uri="http://schemas.openxmlformats.org/drawingml/2006/table">
@@ -5200,9 +3867,9 @@
                 <a:tableStyleId>{3C2FFA5D-87B4-456A-9821-1D502468CF0F}</a:tableStyleId>
               </a:tblPr>
               <a:tblGrid>
-                <a:gridCol w="1422447"/>
+                <a:gridCol w="1213864"/>
               </a:tblGrid>
-              <a:tr h="195897">
+              <a:tr h="211221">
                 <a:tc>
                   <a:txBody>
                     <a:bodyPr/>
@@ -5219,7 +3886,7 @@
                   <a:tcPr/>
                 </a:tc>
               </a:tr>
-              <a:tr h="195897">
+              <a:tr h="168977">
                 <a:tc>
                   <a:txBody>
                     <a:bodyPr/>
@@ -5236,7 +3903,7 @@
                   <a:tcPr/>
                 </a:tc>
               </a:tr>
-              <a:tr h="195897">
+              <a:tr h="168977">
                 <a:tc>
                   <a:txBody>
                     <a:bodyPr/>
@@ -5253,7 +3920,41 @@
                   <a:tcPr/>
                 </a:tc>
               </a:tr>
-              <a:tr h="195897">
+              <a:tr h="168977">
+                <a:tc>
+                  <a:txBody>
+                    <a:bodyPr/>
+                    <a:lstStyle/>
+                    <a:p>
+                      <a:pPr algn="ctr"/>
+                      <a:r>
+                        <a:rPr lang="en-US" sz="1000" dirty="0" smtClean="0"/>
+                        <a:t>Blues</a:t>
+                      </a:r>
+                      <a:endParaRPr lang="en-US" sz="1000" dirty="0"/>
+                    </a:p>
+                  </a:txBody>
+                  <a:tcPr/>
+                </a:tc>
+              </a:tr>
+              <a:tr h="168977">
+                <a:tc>
+                  <a:txBody>
+                    <a:bodyPr/>
+                    <a:lstStyle/>
+                    <a:p>
+                      <a:pPr algn="ctr"/>
+                      <a:r>
+                        <a:rPr lang="en-US" sz="1000" dirty="0" smtClean="0"/>
+                        <a:t>Augmented</a:t>
+                      </a:r>
+                      <a:endParaRPr lang="en-US" sz="1000" dirty="0"/>
+                    </a:p>
+                  </a:txBody>
+                  <a:tcPr/>
+                </a:tc>
+              </a:tr>
+              <a:tr h="168977">
                 <a:tc>
                   <a:txBody>
                     <a:bodyPr/>
@@ -5270,7 +3971,7 @@
                   <a:tcPr/>
                 </a:tc>
               </a:tr>
-              <a:tr h="195897">
+              <a:tr h="168977">
                 <a:tc>
                   <a:txBody>
                     <a:bodyPr/>
@@ -5287,7 +3988,7 @@
                   <a:tcPr/>
                 </a:tc>
               </a:tr>
-              <a:tr h="195897">
+              <a:tr h="168977">
                 <a:tc>
                   <a:txBody>
                     <a:bodyPr/>
@@ -5304,7 +4005,7 @@
                   <a:tcPr/>
                 </a:tc>
               </a:tr>
-              <a:tr h="195897">
+              <a:tr h="168977">
                 <a:tc>
                   <a:txBody>
                     <a:bodyPr/>
@@ -5321,7 +4022,7 @@
                   <a:tcPr/>
                 </a:tc>
               </a:tr>
-              <a:tr h="195897">
+              <a:tr h="168977">
                 <a:tc>
                   <a:txBody>
                     <a:bodyPr/>
@@ -5338,7 +4039,7 @@
                   <a:tcPr/>
                 </a:tc>
               </a:tr>
-              <a:tr h="195897">
+              <a:tr h="168977">
                 <a:tc>
                   <a:txBody>
                     <a:bodyPr/>
@@ -5355,7 +4056,7 @@
                   <a:tcPr/>
                 </a:tc>
               </a:tr>
-              <a:tr h="195897">
+              <a:tr h="168977">
                 <a:tc>
                   <a:txBody>
                     <a:bodyPr/>
@@ -5372,7 +4073,7 @@
                   <a:tcPr/>
                 </a:tc>
               </a:tr>
-              <a:tr h="195897">
+              <a:tr h="168977">
                 <a:tc>
                   <a:txBody>
                     <a:bodyPr/>
@@ -5381,7 +4082,7 @@
                       <a:pPr algn="ctr"/>
                       <a:r>
                         <a:rPr lang="en-US" sz="1000" dirty="0" smtClean="0"/>
-                        <a:t>Blues</a:t>
+                        <a:t>Octaves</a:t>
                       </a:r>
                       <a:endParaRPr lang="en-US" sz="1000" dirty="0"/>
                     </a:p>
@@ -5389,41 +4090,7 @@
                   <a:tcPr/>
                 </a:tc>
               </a:tr>
-              <a:tr h="195897">
-                <a:tc>
-                  <a:txBody>
-                    <a:bodyPr/>
-                    <a:lstStyle/>
-                    <a:p>
-                      <a:pPr algn="ctr"/>
-                      <a:r>
-                        <a:rPr lang="en-US" sz="1000" dirty="0" smtClean="0"/>
-                        <a:t>Augmented</a:t>
-                      </a:r>
-                      <a:endParaRPr lang="en-US" sz="1000" dirty="0"/>
-                    </a:p>
-                  </a:txBody>
-                  <a:tcPr/>
-                </a:tc>
-              </a:tr>
-              <a:tr h="195897">
-                <a:tc>
-                  <a:txBody>
-                    <a:bodyPr/>
-                    <a:lstStyle/>
-                    <a:p>
-                      <a:pPr algn="ctr"/>
-                      <a:r>
-                        <a:rPr lang="en-US" sz="1000" smtClean="0"/>
-                        <a:t>Octaves</a:t>
-                      </a:r>
-                      <a:endParaRPr lang="en-US" sz="1000" dirty="0"/>
-                    </a:p>
-                  </a:txBody>
-                  <a:tcPr/>
-                </a:tc>
-              </a:tr>
-              <a:tr h="195897">
+              <a:tr h="168977">
                 <a:tc>
                   <a:txBody>
                     <a:bodyPr/>
@@ -5453,13 +4120,13 @@
           <p:nvPr>
             <p:extLst>
               <p:ext uri="{D42A27DB-BD31-4B8C-83A1-F6EECF244321}">
-                <p14:modId xmlns:p14="http://schemas.microsoft.com/office/powerpoint/2010/main" val="2573889307"/>
+                <p14:modId xmlns:p14="http://schemas.microsoft.com/office/powerpoint/2010/main" val="1106549228"/>
               </p:ext>
             </p:extLst>
           </p:nvPr>
         </p:nvGraphicFramePr>
         <p:xfrm>
-          <a:off x="1917747" y="3388367"/>
+          <a:off x="1658716" y="2900336"/>
           <a:ext cx="2020108" cy="2118359"/>
         </p:xfrm>
         <a:graphic>
@@ -5615,14 +4282,14 @@
           <p:nvPr>
             <p:extLst>
               <p:ext uri="{D42A27DB-BD31-4B8C-83A1-F6EECF244321}">
-                <p14:modId xmlns:p14="http://schemas.microsoft.com/office/powerpoint/2010/main" val="329222450"/>
+                <p14:modId xmlns:p14="http://schemas.microsoft.com/office/powerpoint/2010/main" val="2729806016"/>
               </p:ext>
             </p:extLst>
           </p:nvPr>
         </p:nvGraphicFramePr>
         <p:xfrm>
-          <a:off x="1917747" y="5613407"/>
-          <a:ext cx="2020108" cy="1005839"/>
+          <a:off x="1658716" y="5241771"/>
+          <a:ext cx="2020108" cy="1356359"/>
         </p:xfrm>
         <a:graphic>
           <a:graphicData uri="http://schemas.openxmlformats.org/drawingml/2006/table">
@@ -5642,7 +4309,7 @@
                       <a:pPr algn="ctr"/>
                       <a:r>
                         <a:rPr lang="en-US" sz="1400" dirty="0" smtClean="0"/>
-                        <a:t>Octaves</a:t>
+                        <a:t>Octaves / Root</a:t>
                       </a:r>
                       <a:endParaRPr lang="en-US" sz="1400" dirty="0"/>
                     </a:p>
@@ -5658,14 +4325,26 @@
                     <a:p>
                       <a:pPr algn="l"/>
                       <a:r>
-                        <a:rPr lang="en-US" sz="1000" dirty="0" smtClean="0"/>
+                        <a:rPr lang="en-US" sz="900" dirty="0" smtClean="0"/>
                         <a:t>This simply selects the number of repeats</a:t>
                       </a:r>
                       <a:r>
-                        <a:rPr lang="en-US" sz="1000" baseline="0" dirty="0" smtClean="0"/>
-                        <a:t> of the arpeggio (1 to 5), with each being transposed to the next octave up.</a:t>
-                      </a:r>
-                      <a:endParaRPr lang="en-US" sz="1000" dirty="0"/>
+                        <a:rPr lang="en-US" sz="900" baseline="0" dirty="0" smtClean="0"/>
+                        <a:t> of the arpeggio (1 to 5), with each being transposed to the next octave </a:t>
+                      </a:r>
+                      <a:r>
+                        <a:rPr lang="en-US" sz="900" baseline="0" dirty="0" smtClean="0"/>
+                        <a:t>up, and also sets the root note of the arpeggio. The exact </a:t>
+                      </a:r>
+                      <a:r>
+                        <a:rPr lang="en-US" sz="900" baseline="0" dirty="0" err="1" smtClean="0"/>
+                        <a:t>behaviour</a:t>
+                      </a:r>
+                      <a:r>
+                        <a:rPr lang="en-US" sz="900" baseline="0" dirty="0" smtClean="0"/>
+                        <a:t> of this parameter depends upon the settings selected in control mode.</a:t>
+                      </a:r>
+                      <a:endParaRPr lang="en-US" sz="900" dirty="0"/>
                     </a:p>
                   </a:txBody>
                   <a:tcPr/>
@@ -5683,7 +4362,7 @@
         </p:nvSpPr>
         <p:spPr>
           <a:xfrm>
-            <a:off x="5806599" y="93260"/>
+            <a:off x="5773752" y="102764"/>
             <a:ext cx="2243648" cy="400110"/>
           </a:xfrm>
           <a:prstGeom prst="rect">
@@ -5721,7 +4400,7 @@
         </p:nvSpPr>
         <p:spPr>
           <a:xfrm>
-            <a:off x="8498974" y="102722"/>
+            <a:off x="8466127" y="168416"/>
             <a:ext cx="1389836" cy="230832"/>
           </a:xfrm>
           <a:prstGeom prst="rect">
@@ -5756,6 +4435,1723 @@
               <a:t> 2013</a:t>
             </a:r>
             <a:endParaRPr lang="en-US" sz="900" i="1" dirty="0"/>
+          </a:p>
+        </p:txBody>
+      </p:sp>
+      <p:graphicFrame>
+        <p:nvGraphicFramePr>
+          <p:cNvPr id="16" name="Table 15"/>
+          <p:cNvGraphicFramePr>
+            <a:graphicFrameLocks noGrp="1"/>
+          </p:cNvGraphicFramePr>
+          <p:nvPr>
+            <p:extLst>
+              <p:ext uri="{D42A27DB-BD31-4B8C-83A1-F6EECF244321}">
+                <p14:modId xmlns:p14="http://schemas.microsoft.com/office/powerpoint/2010/main" val="797502327"/>
+              </p:ext>
+            </p:extLst>
+          </p:nvPr>
+        </p:nvGraphicFramePr>
+        <p:xfrm>
+          <a:off x="5829558" y="4336391"/>
+          <a:ext cx="1902244" cy="1082040"/>
+        </p:xfrm>
+        <a:graphic>
+          <a:graphicData uri="http://schemas.openxmlformats.org/drawingml/2006/table">
+            <a:tbl>
+              <a:tblPr>
+                <a:tableStyleId>{3C2FFA5D-87B4-456A-9821-1D502468CF0F}</a:tableStyleId>
+              </a:tblPr>
+              <a:tblGrid>
+                <a:gridCol w="571750"/>
+                <a:gridCol w="595006"/>
+                <a:gridCol w="375405"/>
+                <a:gridCol w="360083"/>
+              </a:tblGrid>
+              <a:tr h="266700">
+                <a:tc>
+                  <a:txBody>
+                    <a:bodyPr/>
+                    <a:lstStyle/>
+                    <a:p>
+                      <a:pPr algn="ctr"/>
+                      <a:r>
+                        <a:rPr lang="en-US" sz="1200" b="1" dirty="0" smtClean="0"/>
+                        <a:t>A0</a:t>
+                      </a:r>
+                      <a:endParaRPr lang="en-US" sz="1200" b="1" dirty="0"/>
+                    </a:p>
+                  </a:txBody>
+                  <a:tcPr/>
+                </a:tc>
+                <a:tc>
+                  <a:txBody>
+                    <a:bodyPr/>
+                    <a:lstStyle/>
+                    <a:p>
+                      <a:pPr algn="ctr"/>
+                      <a:r>
+                        <a:rPr lang="en-US" sz="1200" b="1" dirty="0" smtClean="0"/>
+                        <a:t>A1</a:t>
+                      </a:r>
+                      <a:endParaRPr lang="en-US" sz="1200" b="1" dirty="0"/>
+                    </a:p>
+                  </a:txBody>
+                  <a:tcPr/>
+                </a:tc>
+                <a:tc gridSpan="2">
+                  <a:txBody>
+                    <a:bodyPr/>
+                    <a:lstStyle/>
+                    <a:p>
+                      <a:pPr algn="ctr"/>
+                      <a:r>
+                        <a:rPr lang="en-US" sz="1200" b="1" i="1" dirty="0" smtClean="0"/>
+                        <a:t>Default</a:t>
+                      </a:r>
+                      <a:endParaRPr lang="en-US" sz="1100" b="1" i="1" dirty="0"/>
+                    </a:p>
+                  </a:txBody>
+                  <a:tcPr anchor="ctr"/>
+                </a:tc>
+                <a:tc hMerge="1">
+                  <a:txBody>
+                    <a:bodyPr/>
+                    <a:lstStyle/>
+                    <a:p>
+                      <a:endParaRPr lang="en-US" dirty="0"/>
+                    </a:p>
+                  </a:txBody>
+                  <a:tcPr anchor="ctr"/>
+                </a:tc>
+              </a:tr>
+              <a:tr h="121615">
+                <a:tc>
+                  <a:txBody>
+                    <a:bodyPr/>
+                    <a:lstStyle/>
+                    <a:p>
+                      <a:pPr algn="ctr"/>
+                      <a:r>
+                        <a:rPr lang="en-US" sz="1100" dirty="0" smtClean="0"/>
+                        <a:t>Mode</a:t>
+                      </a:r>
+                      <a:endParaRPr lang="en-US" sz="1100" dirty="0"/>
+                    </a:p>
+                  </a:txBody>
+                  <a:tcPr/>
+                </a:tc>
+                <a:tc>
+                  <a:txBody>
+                    <a:bodyPr/>
+                    <a:lstStyle/>
+                    <a:p>
+                      <a:pPr algn="ctr"/>
+                      <a:r>
+                        <a:rPr lang="en-US" sz="1100" dirty="0" smtClean="0"/>
+                        <a:t>O/R</a:t>
+                      </a:r>
+                      <a:endParaRPr lang="en-US" sz="1100" dirty="0"/>
+                    </a:p>
+                  </a:txBody>
+                  <a:tcPr/>
+                </a:tc>
+                <a:tc>
+                  <a:txBody>
+                    <a:bodyPr/>
+                    <a:lstStyle/>
+                    <a:p>
+                      <a:pPr algn="ctr"/>
+                      <a:r>
+                        <a:rPr lang="en-US" sz="1200" b="1" dirty="0" smtClean="0"/>
+                        <a:t>D0</a:t>
+                      </a:r>
+                      <a:endParaRPr lang="en-US" sz="1200" b="1" dirty="0"/>
+                    </a:p>
+                  </a:txBody>
+                  <a:tcPr anchor="ctr"/>
+                </a:tc>
+                <a:tc>
+                  <a:txBody>
+                    <a:bodyPr/>
+                    <a:lstStyle/>
+                    <a:p>
+                      <a:pPr algn="ctr"/>
+                      <a:r>
+                        <a:rPr lang="en-US" sz="1200" b="1" dirty="0" smtClean="0"/>
+                        <a:t>D1</a:t>
+                      </a:r>
+                      <a:endParaRPr lang="en-US" sz="1200" b="1" dirty="0"/>
+                    </a:p>
+                  </a:txBody>
+                  <a:tcPr anchor="ctr"/>
+                </a:tc>
+              </a:tr>
+              <a:tr h="121615">
+                <a:tc>
+                  <a:txBody>
+                    <a:bodyPr/>
+                    <a:lstStyle/>
+                    <a:p>
+                      <a:pPr algn="ctr"/>
+                      <a:r>
+                        <a:rPr lang="en-US" sz="1200" b="1" dirty="0" smtClean="0"/>
+                        <a:t>A2</a:t>
+                      </a:r>
+                      <a:endParaRPr lang="en-US" sz="1200" b="1" dirty="0"/>
+                    </a:p>
+                  </a:txBody>
+                  <a:tcPr/>
+                </a:tc>
+                <a:tc>
+                  <a:txBody>
+                    <a:bodyPr/>
+                    <a:lstStyle/>
+                    <a:p>
+                      <a:pPr algn="ctr"/>
+                      <a:r>
+                        <a:rPr lang="en-US" sz="1200" b="1" dirty="0" smtClean="0"/>
+                        <a:t>A3</a:t>
+                      </a:r>
+                      <a:endParaRPr lang="en-US" sz="1200" b="1" dirty="0"/>
+                    </a:p>
+                  </a:txBody>
+                  <a:tcPr/>
+                </a:tc>
+                <a:tc rowSpan="2">
+                  <a:txBody>
+                    <a:bodyPr/>
+                    <a:lstStyle/>
+                    <a:p>
+                      <a:pPr algn="ctr"/>
+                      <a:endParaRPr lang="en-US" sz="1200" dirty="0"/>
+                    </a:p>
+                  </a:txBody>
+                  <a:tcPr anchor="ctr"/>
+                </a:tc>
+                <a:tc rowSpan="2">
+                  <a:txBody>
+                    <a:bodyPr/>
+                    <a:lstStyle/>
+                    <a:p>
+                      <a:pPr algn="ctr"/>
+                      <a:r>
+                        <a:rPr lang="en-US" sz="1200" dirty="0" smtClean="0"/>
+                        <a:t>On</a:t>
+                      </a:r>
+                      <a:endParaRPr lang="en-US" sz="1200" dirty="0"/>
+                    </a:p>
+                  </a:txBody>
+                  <a:tcPr anchor="ctr"/>
+                </a:tc>
+              </a:tr>
+              <a:tr h="170261">
+                <a:tc>
+                  <a:txBody>
+                    <a:bodyPr/>
+                    <a:lstStyle/>
+                    <a:p>
+                      <a:pPr algn="ctr"/>
+                      <a:r>
+                        <a:rPr lang="en-US" sz="1100" dirty="0" smtClean="0"/>
+                        <a:t>S/D</a:t>
+                      </a:r>
+                      <a:endParaRPr lang="en-US" sz="1100" dirty="0"/>
+                    </a:p>
+                  </a:txBody>
+                  <a:tcPr/>
+                </a:tc>
+                <a:tc>
+                  <a:txBody>
+                    <a:bodyPr/>
+                    <a:lstStyle/>
+                    <a:p>
+                      <a:pPr algn="ctr"/>
+                      <a:r>
+                        <a:rPr lang="en-US" sz="1100" dirty="0" smtClean="0"/>
+                        <a:t>Scale</a:t>
+                      </a:r>
+                      <a:endParaRPr lang="en-US" sz="1100" dirty="0"/>
+                    </a:p>
+                  </a:txBody>
+                  <a:tcPr/>
+                </a:tc>
+                <a:tc vMerge="1">
+                  <a:txBody>
+                    <a:bodyPr/>
+                    <a:lstStyle/>
+                    <a:p>
+                      <a:endParaRPr lang="en-US" sz="1400" dirty="0"/>
+                    </a:p>
+                  </a:txBody>
+                  <a:tcPr/>
+                </a:tc>
+                <a:tc vMerge="1">
+                  <a:txBody>
+                    <a:bodyPr/>
+                    <a:lstStyle/>
+                    <a:p>
+                      <a:endParaRPr lang="en-US" sz="1400" dirty="0"/>
+                    </a:p>
+                  </a:txBody>
+                  <a:tcPr/>
+                </a:tc>
+              </a:tr>
+            </a:tbl>
+          </a:graphicData>
+        </a:graphic>
+      </p:graphicFrame>
+      <p:graphicFrame>
+        <p:nvGraphicFramePr>
+          <p:cNvPr id="17" name="Table 16"/>
+          <p:cNvGraphicFramePr>
+            <a:graphicFrameLocks noGrp="1"/>
+          </p:cNvGraphicFramePr>
+          <p:nvPr>
+            <p:extLst>
+              <p:ext uri="{D42A27DB-BD31-4B8C-83A1-F6EECF244321}">
+                <p14:modId xmlns:p14="http://schemas.microsoft.com/office/powerpoint/2010/main" val="3154542883"/>
+              </p:ext>
+            </p:extLst>
+          </p:nvPr>
+        </p:nvGraphicFramePr>
+        <p:xfrm>
+          <a:off x="7819947" y="4336391"/>
+          <a:ext cx="1902244" cy="1082040"/>
+        </p:xfrm>
+        <a:graphic>
+          <a:graphicData uri="http://schemas.openxmlformats.org/drawingml/2006/table">
+            <a:tbl>
+              <a:tblPr>
+                <a:tableStyleId>{3C2FFA5D-87B4-456A-9821-1D502468CF0F}</a:tableStyleId>
+              </a:tblPr>
+              <a:tblGrid>
+                <a:gridCol w="571750"/>
+                <a:gridCol w="595006"/>
+                <a:gridCol w="375405"/>
+                <a:gridCol w="360083"/>
+              </a:tblGrid>
+              <a:tr h="266700">
+                <a:tc>
+                  <a:txBody>
+                    <a:bodyPr/>
+                    <a:lstStyle/>
+                    <a:p>
+                      <a:pPr algn="ctr"/>
+                      <a:r>
+                        <a:rPr lang="en-US" sz="1200" b="1" dirty="0" smtClean="0"/>
+                        <a:t>A0</a:t>
+                      </a:r>
+                      <a:endParaRPr lang="en-US" sz="1200" b="1" dirty="0"/>
+                    </a:p>
+                  </a:txBody>
+                  <a:tcPr/>
+                </a:tc>
+                <a:tc>
+                  <a:txBody>
+                    <a:bodyPr/>
+                    <a:lstStyle/>
+                    <a:p>
+                      <a:pPr algn="ctr"/>
+                      <a:r>
+                        <a:rPr lang="en-US" sz="1200" b="1" dirty="0" smtClean="0"/>
+                        <a:t>A1</a:t>
+                      </a:r>
+                      <a:endParaRPr lang="en-US" sz="1200" b="1" dirty="0"/>
+                    </a:p>
+                  </a:txBody>
+                  <a:tcPr/>
+                </a:tc>
+                <a:tc gridSpan="2">
+                  <a:txBody>
+                    <a:bodyPr/>
+                    <a:lstStyle/>
+                    <a:p>
+                      <a:pPr algn="ctr"/>
+                      <a:r>
+                        <a:rPr lang="en-US" sz="1200" b="1" i="1" dirty="0" smtClean="0"/>
+                        <a:t>Default</a:t>
+                      </a:r>
+                      <a:endParaRPr lang="en-US" sz="1100" b="1" i="1" dirty="0"/>
+                    </a:p>
+                  </a:txBody>
+                  <a:tcPr anchor="ctr"/>
+                </a:tc>
+                <a:tc hMerge="1">
+                  <a:txBody>
+                    <a:bodyPr/>
+                    <a:lstStyle/>
+                    <a:p>
+                      <a:endParaRPr lang="en-US" dirty="0"/>
+                    </a:p>
+                  </a:txBody>
+                  <a:tcPr anchor="ctr"/>
+                </a:tc>
+              </a:tr>
+              <a:tr h="121615">
+                <a:tc>
+                  <a:txBody>
+                    <a:bodyPr/>
+                    <a:lstStyle/>
+                    <a:p>
+                      <a:pPr algn="ctr"/>
+                      <a:r>
+                        <a:rPr lang="en-US" sz="1100" dirty="0" smtClean="0"/>
+                        <a:t>O/R</a:t>
+                      </a:r>
+                      <a:endParaRPr lang="en-US" sz="1100" dirty="0"/>
+                    </a:p>
+                  </a:txBody>
+                  <a:tcPr/>
+                </a:tc>
+                <a:tc>
+                  <a:txBody>
+                    <a:bodyPr/>
+                    <a:lstStyle/>
+                    <a:p>
+                      <a:pPr algn="ctr"/>
+                      <a:r>
+                        <a:rPr lang="en-US" sz="1100" dirty="0" smtClean="0"/>
+                        <a:t>Scale</a:t>
+                      </a:r>
+                      <a:endParaRPr lang="en-US" sz="1100" dirty="0"/>
+                    </a:p>
+                  </a:txBody>
+                  <a:tcPr/>
+                </a:tc>
+                <a:tc>
+                  <a:txBody>
+                    <a:bodyPr/>
+                    <a:lstStyle/>
+                    <a:p>
+                      <a:pPr algn="ctr"/>
+                      <a:r>
+                        <a:rPr lang="en-US" sz="1200" b="1" dirty="0" smtClean="0"/>
+                        <a:t>D0</a:t>
+                      </a:r>
+                      <a:endParaRPr lang="en-US" sz="1200" b="1" dirty="0"/>
+                    </a:p>
+                  </a:txBody>
+                  <a:tcPr anchor="ctr"/>
+                </a:tc>
+                <a:tc>
+                  <a:txBody>
+                    <a:bodyPr/>
+                    <a:lstStyle/>
+                    <a:p>
+                      <a:pPr algn="ctr"/>
+                      <a:r>
+                        <a:rPr lang="en-US" sz="1200" b="1" dirty="0" smtClean="0"/>
+                        <a:t>D1</a:t>
+                      </a:r>
+                      <a:endParaRPr lang="en-US" sz="1200" b="1" dirty="0"/>
+                    </a:p>
+                  </a:txBody>
+                  <a:tcPr anchor="ctr"/>
+                </a:tc>
+              </a:tr>
+              <a:tr h="121615">
+                <a:tc>
+                  <a:txBody>
+                    <a:bodyPr/>
+                    <a:lstStyle/>
+                    <a:p>
+                      <a:pPr algn="ctr"/>
+                      <a:r>
+                        <a:rPr lang="en-US" sz="1200" b="1" dirty="0" smtClean="0"/>
+                        <a:t>A2</a:t>
+                      </a:r>
+                      <a:endParaRPr lang="en-US" sz="1200" b="1" dirty="0"/>
+                    </a:p>
+                  </a:txBody>
+                  <a:tcPr/>
+                </a:tc>
+                <a:tc>
+                  <a:txBody>
+                    <a:bodyPr/>
+                    <a:lstStyle/>
+                    <a:p>
+                      <a:pPr algn="ctr"/>
+                      <a:r>
+                        <a:rPr lang="en-US" sz="1200" b="1" dirty="0" smtClean="0"/>
+                        <a:t>A3</a:t>
+                      </a:r>
+                      <a:endParaRPr lang="en-US" sz="1200" b="1" dirty="0"/>
+                    </a:p>
+                  </a:txBody>
+                  <a:tcPr/>
+                </a:tc>
+                <a:tc rowSpan="2">
+                  <a:txBody>
+                    <a:bodyPr/>
+                    <a:lstStyle/>
+                    <a:p>
+                      <a:pPr algn="ctr"/>
+                      <a:r>
+                        <a:rPr lang="en-US" sz="1200" dirty="0" smtClean="0"/>
+                        <a:t>On</a:t>
+                      </a:r>
+                    </a:p>
+                  </a:txBody>
+                  <a:tcPr anchor="ctr"/>
+                </a:tc>
+                <a:tc rowSpan="2">
+                  <a:txBody>
+                    <a:bodyPr/>
+                    <a:lstStyle/>
+                    <a:p>
+                      <a:pPr algn="ctr"/>
+                      <a:endParaRPr lang="en-US" sz="1200" dirty="0"/>
+                    </a:p>
+                  </a:txBody>
+                  <a:tcPr anchor="ctr"/>
+                </a:tc>
+              </a:tr>
+              <a:tr h="170261">
+                <a:tc>
+                  <a:txBody>
+                    <a:bodyPr/>
+                    <a:lstStyle/>
+                    <a:p>
+                      <a:pPr algn="ctr"/>
+                      <a:r>
+                        <a:rPr lang="en-US" sz="1100" dirty="0" smtClean="0"/>
+                        <a:t>S/D</a:t>
+                      </a:r>
+                      <a:endParaRPr lang="en-US" sz="1100" dirty="0"/>
+                    </a:p>
+                  </a:txBody>
+                  <a:tcPr/>
+                </a:tc>
+                <a:tc>
+                  <a:txBody>
+                    <a:bodyPr/>
+                    <a:lstStyle/>
+                    <a:p>
+                      <a:pPr algn="ctr"/>
+                      <a:r>
+                        <a:rPr lang="en-US" sz="1100" dirty="0" smtClean="0"/>
+                        <a:t>Mode</a:t>
+                      </a:r>
+                      <a:endParaRPr lang="en-US" sz="1100" dirty="0"/>
+                    </a:p>
+                  </a:txBody>
+                  <a:tcPr/>
+                </a:tc>
+                <a:tc vMerge="1">
+                  <a:txBody>
+                    <a:bodyPr/>
+                    <a:lstStyle/>
+                    <a:p>
+                      <a:endParaRPr lang="en-US" sz="1400" dirty="0"/>
+                    </a:p>
+                  </a:txBody>
+                  <a:tcPr/>
+                </a:tc>
+                <a:tc vMerge="1">
+                  <a:txBody>
+                    <a:bodyPr/>
+                    <a:lstStyle/>
+                    <a:p>
+                      <a:endParaRPr lang="en-US" sz="1400" dirty="0"/>
+                    </a:p>
+                  </a:txBody>
+                  <a:tcPr/>
+                </a:tc>
+              </a:tr>
+            </a:tbl>
+          </a:graphicData>
+        </a:graphic>
+      </p:graphicFrame>
+      <p:graphicFrame>
+        <p:nvGraphicFramePr>
+          <p:cNvPr id="18" name="Table 17"/>
+          <p:cNvGraphicFramePr>
+            <a:graphicFrameLocks noGrp="1"/>
+          </p:cNvGraphicFramePr>
+          <p:nvPr>
+            <p:extLst>
+              <p:ext uri="{D42A27DB-BD31-4B8C-83A1-F6EECF244321}">
+                <p14:modId xmlns:p14="http://schemas.microsoft.com/office/powerpoint/2010/main" val="2680997665"/>
+              </p:ext>
+            </p:extLst>
+          </p:nvPr>
+        </p:nvGraphicFramePr>
+        <p:xfrm>
+          <a:off x="3833352" y="5514982"/>
+          <a:ext cx="1902244" cy="1082040"/>
+        </p:xfrm>
+        <a:graphic>
+          <a:graphicData uri="http://schemas.openxmlformats.org/drawingml/2006/table">
+            <a:tbl>
+              <a:tblPr>
+                <a:tableStyleId>{3C2FFA5D-87B4-456A-9821-1D502468CF0F}</a:tableStyleId>
+              </a:tblPr>
+              <a:tblGrid>
+                <a:gridCol w="571750"/>
+                <a:gridCol w="595006"/>
+                <a:gridCol w="375405"/>
+                <a:gridCol w="360083"/>
+              </a:tblGrid>
+              <a:tr h="266700">
+                <a:tc>
+                  <a:txBody>
+                    <a:bodyPr/>
+                    <a:lstStyle/>
+                    <a:p>
+                      <a:pPr algn="ctr"/>
+                      <a:r>
+                        <a:rPr lang="en-US" sz="1200" b="1" dirty="0" smtClean="0"/>
+                        <a:t>A0</a:t>
+                      </a:r>
+                      <a:endParaRPr lang="en-US" sz="1200" b="1" dirty="0"/>
+                    </a:p>
+                  </a:txBody>
+                  <a:tcPr/>
+                </a:tc>
+                <a:tc>
+                  <a:txBody>
+                    <a:bodyPr/>
+                    <a:lstStyle/>
+                    <a:p>
+                      <a:pPr algn="ctr"/>
+                      <a:r>
+                        <a:rPr lang="en-US" sz="1200" b="1" dirty="0" smtClean="0"/>
+                        <a:t>A1</a:t>
+                      </a:r>
+                      <a:endParaRPr lang="en-US" sz="1200" b="1" dirty="0"/>
+                    </a:p>
+                  </a:txBody>
+                  <a:tcPr/>
+                </a:tc>
+                <a:tc gridSpan="2">
+                  <a:txBody>
+                    <a:bodyPr/>
+                    <a:lstStyle/>
+                    <a:p>
+                      <a:pPr algn="ctr"/>
+                      <a:r>
+                        <a:rPr lang="en-US" sz="1200" b="1" i="1" dirty="0" smtClean="0"/>
+                        <a:t>Default</a:t>
+                      </a:r>
+                      <a:endParaRPr lang="en-US" sz="1100" b="1" i="1" dirty="0"/>
+                    </a:p>
+                  </a:txBody>
+                  <a:tcPr anchor="ctr"/>
+                </a:tc>
+                <a:tc hMerge="1">
+                  <a:txBody>
+                    <a:bodyPr/>
+                    <a:lstStyle/>
+                    <a:p>
+                      <a:endParaRPr lang="en-US" dirty="0"/>
+                    </a:p>
+                  </a:txBody>
+                  <a:tcPr anchor="ctr"/>
+                </a:tc>
+              </a:tr>
+              <a:tr h="121615">
+                <a:tc>
+                  <a:txBody>
+                    <a:bodyPr/>
+                    <a:lstStyle/>
+                    <a:p>
+                      <a:pPr algn="ctr"/>
+                      <a:r>
+                        <a:rPr lang="en-US" sz="1100" dirty="0" smtClean="0"/>
+                        <a:t>S/D</a:t>
+                      </a:r>
+                      <a:endParaRPr lang="en-US" sz="1100" dirty="0"/>
+                    </a:p>
+                  </a:txBody>
+                  <a:tcPr/>
+                </a:tc>
+                <a:tc>
+                  <a:txBody>
+                    <a:bodyPr/>
+                    <a:lstStyle/>
+                    <a:p>
+                      <a:pPr algn="ctr"/>
+                      <a:r>
+                        <a:rPr lang="en-US" sz="1100" dirty="0" smtClean="0"/>
+                        <a:t>Mode</a:t>
+                      </a:r>
+                      <a:endParaRPr lang="en-US" sz="1100" dirty="0"/>
+                    </a:p>
+                  </a:txBody>
+                  <a:tcPr/>
+                </a:tc>
+                <a:tc>
+                  <a:txBody>
+                    <a:bodyPr/>
+                    <a:lstStyle/>
+                    <a:p>
+                      <a:pPr algn="ctr"/>
+                      <a:r>
+                        <a:rPr lang="en-US" sz="1200" b="1" dirty="0" smtClean="0"/>
+                        <a:t>D0</a:t>
+                      </a:r>
+                      <a:endParaRPr lang="en-US" sz="1200" b="1" dirty="0"/>
+                    </a:p>
+                  </a:txBody>
+                  <a:tcPr anchor="ctr"/>
+                </a:tc>
+                <a:tc>
+                  <a:txBody>
+                    <a:bodyPr/>
+                    <a:lstStyle/>
+                    <a:p>
+                      <a:pPr algn="ctr"/>
+                      <a:r>
+                        <a:rPr lang="en-US" sz="1200" b="1" dirty="0" smtClean="0"/>
+                        <a:t>D1</a:t>
+                      </a:r>
+                      <a:endParaRPr lang="en-US" sz="1200" b="1" dirty="0"/>
+                    </a:p>
+                  </a:txBody>
+                  <a:tcPr anchor="ctr"/>
+                </a:tc>
+              </a:tr>
+              <a:tr h="121615">
+                <a:tc>
+                  <a:txBody>
+                    <a:bodyPr/>
+                    <a:lstStyle/>
+                    <a:p>
+                      <a:pPr algn="ctr"/>
+                      <a:r>
+                        <a:rPr lang="en-US" sz="1200" b="1" dirty="0" smtClean="0"/>
+                        <a:t>A2</a:t>
+                      </a:r>
+                      <a:endParaRPr lang="en-US" sz="1200" b="1" dirty="0"/>
+                    </a:p>
+                  </a:txBody>
+                  <a:tcPr/>
+                </a:tc>
+                <a:tc>
+                  <a:txBody>
+                    <a:bodyPr/>
+                    <a:lstStyle/>
+                    <a:p>
+                      <a:pPr algn="ctr"/>
+                      <a:r>
+                        <a:rPr lang="en-US" sz="1200" b="1" dirty="0" smtClean="0"/>
+                        <a:t>A3</a:t>
+                      </a:r>
+                      <a:endParaRPr lang="en-US" sz="1200" b="1" dirty="0"/>
+                    </a:p>
+                  </a:txBody>
+                  <a:tcPr/>
+                </a:tc>
+                <a:tc rowSpan="2">
+                  <a:txBody>
+                    <a:bodyPr/>
+                    <a:lstStyle/>
+                    <a:p>
+                      <a:pPr algn="ctr"/>
+                      <a:r>
+                        <a:rPr lang="en-US" sz="1200" dirty="0" smtClean="0"/>
+                        <a:t>On</a:t>
+                      </a:r>
+                      <a:endParaRPr lang="en-US" sz="1200" dirty="0"/>
+                    </a:p>
+                  </a:txBody>
+                  <a:tcPr anchor="ctr"/>
+                </a:tc>
+                <a:tc rowSpan="2">
+                  <a:txBody>
+                    <a:bodyPr/>
+                    <a:lstStyle/>
+                    <a:p>
+                      <a:pPr algn="ctr"/>
+                      <a:r>
+                        <a:rPr lang="en-US" sz="1200" dirty="0" smtClean="0"/>
+                        <a:t>On</a:t>
+                      </a:r>
+                      <a:endParaRPr lang="en-US" sz="1200" dirty="0"/>
+                    </a:p>
+                  </a:txBody>
+                  <a:tcPr anchor="ctr"/>
+                </a:tc>
+              </a:tr>
+              <a:tr h="170261">
+                <a:tc>
+                  <a:txBody>
+                    <a:bodyPr/>
+                    <a:lstStyle/>
+                    <a:p>
+                      <a:pPr algn="ctr"/>
+                      <a:r>
+                        <a:rPr lang="en-US" sz="1100" dirty="0" smtClean="0"/>
+                        <a:t>O/R</a:t>
+                      </a:r>
+                      <a:endParaRPr lang="en-US" sz="1100" dirty="0"/>
+                    </a:p>
+                  </a:txBody>
+                  <a:tcPr marL="36000" marR="36000"/>
+                </a:tc>
+                <a:tc>
+                  <a:txBody>
+                    <a:bodyPr/>
+                    <a:lstStyle/>
+                    <a:p>
+                      <a:pPr algn="ctr"/>
+                      <a:r>
+                        <a:rPr lang="en-US" sz="1100" dirty="0" smtClean="0"/>
+                        <a:t>Scale</a:t>
+                      </a:r>
+                      <a:endParaRPr lang="en-US" sz="1100" dirty="0"/>
+                    </a:p>
+                  </a:txBody>
+                  <a:tcPr/>
+                </a:tc>
+                <a:tc vMerge="1">
+                  <a:txBody>
+                    <a:bodyPr/>
+                    <a:lstStyle/>
+                    <a:p>
+                      <a:endParaRPr lang="en-US" sz="1400" dirty="0"/>
+                    </a:p>
+                  </a:txBody>
+                  <a:tcPr/>
+                </a:tc>
+                <a:tc vMerge="1">
+                  <a:txBody>
+                    <a:bodyPr/>
+                    <a:lstStyle/>
+                    <a:p>
+                      <a:endParaRPr lang="en-US" sz="1400" dirty="0"/>
+                    </a:p>
+                  </a:txBody>
+                  <a:tcPr/>
+                </a:tc>
+              </a:tr>
+            </a:tbl>
+          </a:graphicData>
+        </a:graphic>
+      </p:graphicFrame>
+      <p:graphicFrame>
+        <p:nvGraphicFramePr>
+          <p:cNvPr id="19" name="Table 18"/>
+          <p:cNvGraphicFramePr>
+            <a:graphicFrameLocks noGrp="1"/>
+          </p:cNvGraphicFramePr>
+          <p:nvPr>
+            <p:extLst>
+              <p:ext uri="{D42A27DB-BD31-4B8C-83A1-F6EECF244321}">
+                <p14:modId xmlns:p14="http://schemas.microsoft.com/office/powerpoint/2010/main" val="3631295054"/>
+              </p:ext>
+            </p:extLst>
+          </p:nvPr>
+        </p:nvGraphicFramePr>
+        <p:xfrm>
+          <a:off x="5829558" y="5514982"/>
+          <a:ext cx="1902244" cy="1082040"/>
+        </p:xfrm>
+        <a:graphic>
+          <a:graphicData uri="http://schemas.openxmlformats.org/drawingml/2006/table">
+            <a:tbl>
+              <a:tblPr>
+                <a:tableStyleId>{3C2FFA5D-87B4-456A-9821-1D502468CF0F}</a:tableStyleId>
+              </a:tblPr>
+              <a:tblGrid>
+                <a:gridCol w="571750"/>
+                <a:gridCol w="595006"/>
+                <a:gridCol w="375405"/>
+                <a:gridCol w="360083"/>
+              </a:tblGrid>
+              <a:tr h="266700">
+                <a:tc>
+                  <a:txBody>
+                    <a:bodyPr/>
+                    <a:lstStyle/>
+                    <a:p>
+                      <a:pPr algn="ctr"/>
+                      <a:r>
+                        <a:rPr lang="en-US" sz="1200" b="1" dirty="0" smtClean="0"/>
+                        <a:t>A0</a:t>
+                      </a:r>
+                      <a:endParaRPr lang="en-US" sz="1200" b="1" dirty="0"/>
+                    </a:p>
+                  </a:txBody>
+                  <a:tcPr/>
+                </a:tc>
+                <a:tc>
+                  <a:txBody>
+                    <a:bodyPr/>
+                    <a:lstStyle/>
+                    <a:p>
+                      <a:pPr algn="ctr"/>
+                      <a:r>
+                        <a:rPr lang="en-US" sz="1200" b="1" dirty="0" smtClean="0"/>
+                        <a:t>A1</a:t>
+                      </a:r>
+                      <a:endParaRPr lang="en-US" sz="1200" b="1" dirty="0"/>
+                    </a:p>
+                  </a:txBody>
+                  <a:tcPr/>
+                </a:tc>
+                <a:tc gridSpan="2">
+                  <a:txBody>
+                    <a:bodyPr/>
+                    <a:lstStyle/>
+                    <a:p>
+                      <a:pPr algn="ctr"/>
+                      <a:r>
+                        <a:rPr lang="en-US" sz="1200" b="1" i="1" dirty="0" smtClean="0"/>
+                        <a:t>Default</a:t>
+                      </a:r>
+                      <a:endParaRPr lang="en-US" sz="1100" b="1" i="1" dirty="0"/>
+                    </a:p>
+                  </a:txBody>
+                  <a:tcPr anchor="ctr"/>
+                </a:tc>
+                <a:tc hMerge="1">
+                  <a:txBody>
+                    <a:bodyPr/>
+                    <a:lstStyle/>
+                    <a:p>
+                      <a:endParaRPr lang="en-US" dirty="0"/>
+                    </a:p>
+                  </a:txBody>
+                  <a:tcPr anchor="ctr"/>
+                </a:tc>
+              </a:tr>
+              <a:tr h="121615">
+                <a:tc>
+                  <a:txBody>
+                    <a:bodyPr/>
+                    <a:lstStyle/>
+                    <a:p>
+                      <a:pPr algn="ctr"/>
+                      <a:r>
+                        <a:rPr lang="en-US" sz="1100" dirty="0" smtClean="0"/>
+                        <a:t>S/D</a:t>
+                      </a:r>
+                      <a:endParaRPr lang="en-US" sz="1100" dirty="0"/>
+                    </a:p>
+                  </a:txBody>
+                  <a:tcPr/>
+                </a:tc>
+                <a:tc>
+                  <a:txBody>
+                    <a:bodyPr/>
+                    <a:lstStyle/>
+                    <a:p>
+                      <a:pPr algn="ctr"/>
+                      <a:r>
+                        <a:rPr lang="en-US" sz="1100" dirty="0" smtClean="0"/>
+                        <a:t>Scale</a:t>
+                      </a:r>
+                      <a:endParaRPr lang="en-US" sz="1100" dirty="0"/>
+                    </a:p>
+                  </a:txBody>
+                  <a:tcPr/>
+                </a:tc>
+                <a:tc>
+                  <a:txBody>
+                    <a:bodyPr/>
+                    <a:lstStyle/>
+                    <a:p>
+                      <a:pPr algn="ctr"/>
+                      <a:r>
+                        <a:rPr lang="en-US" sz="1200" b="1" dirty="0" smtClean="0"/>
+                        <a:t>D0</a:t>
+                      </a:r>
+                      <a:endParaRPr lang="en-US" sz="1200" b="1" dirty="0"/>
+                    </a:p>
+                  </a:txBody>
+                  <a:tcPr anchor="ctr"/>
+                </a:tc>
+                <a:tc>
+                  <a:txBody>
+                    <a:bodyPr/>
+                    <a:lstStyle/>
+                    <a:p>
+                      <a:pPr algn="ctr"/>
+                      <a:r>
+                        <a:rPr lang="en-US" sz="1200" b="1" dirty="0" smtClean="0"/>
+                        <a:t>D1</a:t>
+                      </a:r>
+                      <a:endParaRPr lang="en-US" sz="1200" b="1" dirty="0"/>
+                    </a:p>
+                  </a:txBody>
+                  <a:tcPr anchor="ctr"/>
+                </a:tc>
+              </a:tr>
+              <a:tr h="121615">
+                <a:tc>
+                  <a:txBody>
+                    <a:bodyPr/>
+                    <a:lstStyle/>
+                    <a:p>
+                      <a:pPr algn="ctr"/>
+                      <a:r>
+                        <a:rPr lang="en-US" sz="1200" b="1" dirty="0" smtClean="0"/>
+                        <a:t>A2</a:t>
+                      </a:r>
+                      <a:endParaRPr lang="en-US" sz="1200" b="1" dirty="0"/>
+                    </a:p>
+                  </a:txBody>
+                  <a:tcPr/>
+                </a:tc>
+                <a:tc>
+                  <a:txBody>
+                    <a:bodyPr/>
+                    <a:lstStyle/>
+                    <a:p>
+                      <a:pPr algn="ctr"/>
+                      <a:r>
+                        <a:rPr lang="en-US" sz="1200" b="1" dirty="0" smtClean="0"/>
+                        <a:t>A3</a:t>
+                      </a:r>
+                      <a:endParaRPr lang="en-US" sz="1200" b="1" dirty="0"/>
+                    </a:p>
+                  </a:txBody>
+                  <a:tcPr/>
+                </a:tc>
+                <a:tc rowSpan="2">
+                  <a:txBody>
+                    <a:bodyPr/>
+                    <a:lstStyle/>
+                    <a:p>
+                      <a:pPr algn="ctr"/>
+                      <a:endParaRPr lang="en-US" sz="1200" dirty="0"/>
+                    </a:p>
+                  </a:txBody>
+                  <a:tcPr anchor="ctr"/>
+                </a:tc>
+                <a:tc rowSpan="2">
+                  <a:txBody>
+                    <a:bodyPr/>
+                    <a:lstStyle/>
+                    <a:p>
+                      <a:pPr algn="ctr"/>
+                      <a:r>
+                        <a:rPr lang="en-US" sz="2000" dirty="0" smtClean="0"/>
+                        <a:t>*</a:t>
+                      </a:r>
+                      <a:endParaRPr lang="en-US" sz="2000" dirty="0"/>
+                    </a:p>
+                  </a:txBody>
+                  <a:tcPr anchor="ctr"/>
+                </a:tc>
+              </a:tr>
+              <a:tr h="170261">
+                <a:tc>
+                  <a:txBody>
+                    <a:bodyPr/>
+                    <a:lstStyle/>
+                    <a:p>
+                      <a:pPr algn="ctr"/>
+                      <a:r>
+                        <a:rPr lang="en-US" sz="1100" dirty="0" smtClean="0"/>
+                        <a:t>O/R</a:t>
+                      </a:r>
+                      <a:endParaRPr lang="en-US" sz="1100" dirty="0"/>
+                    </a:p>
+                  </a:txBody>
+                  <a:tcPr/>
+                </a:tc>
+                <a:tc>
+                  <a:txBody>
+                    <a:bodyPr/>
+                    <a:lstStyle/>
+                    <a:p>
+                      <a:pPr algn="ctr"/>
+                      <a:r>
+                        <a:rPr lang="en-US" sz="1100" dirty="0" smtClean="0"/>
+                        <a:t>Mode</a:t>
+                      </a:r>
+                      <a:endParaRPr lang="en-US" sz="1100" dirty="0"/>
+                    </a:p>
+                  </a:txBody>
+                  <a:tcPr/>
+                </a:tc>
+                <a:tc vMerge="1">
+                  <a:txBody>
+                    <a:bodyPr/>
+                    <a:lstStyle/>
+                    <a:p>
+                      <a:endParaRPr lang="en-US" sz="1400" dirty="0"/>
+                    </a:p>
+                  </a:txBody>
+                  <a:tcPr/>
+                </a:tc>
+                <a:tc vMerge="1">
+                  <a:txBody>
+                    <a:bodyPr/>
+                    <a:lstStyle/>
+                    <a:p>
+                      <a:endParaRPr lang="en-US" sz="1400" dirty="0"/>
+                    </a:p>
+                  </a:txBody>
+                  <a:tcPr/>
+                </a:tc>
+              </a:tr>
+            </a:tbl>
+          </a:graphicData>
+        </a:graphic>
+      </p:graphicFrame>
+      <p:graphicFrame>
+        <p:nvGraphicFramePr>
+          <p:cNvPr id="20" name="Table 19"/>
+          <p:cNvGraphicFramePr>
+            <a:graphicFrameLocks noGrp="1"/>
+          </p:cNvGraphicFramePr>
+          <p:nvPr>
+            <p:extLst>
+              <p:ext uri="{D42A27DB-BD31-4B8C-83A1-F6EECF244321}">
+                <p14:modId xmlns:p14="http://schemas.microsoft.com/office/powerpoint/2010/main" val="2455616045"/>
+              </p:ext>
+            </p:extLst>
+          </p:nvPr>
+        </p:nvGraphicFramePr>
+        <p:xfrm>
+          <a:off x="7819947" y="5514982"/>
+          <a:ext cx="1902244" cy="1082040"/>
+        </p:xfrm>
+        <a:graphic>
+          <a:graphicData uri="http://schemas.openxmlformats.org/drawingml/2006/table">
+            <a:tbl>
+              <a:tblPr>
+                <a:tableStyleId>{3C2FFA5D-87B4-456A-9821-1D502468CF0F}</a:tableStyleId>
+              </a:tblPr>
+              <a:tblGrid>
+                <a:gridCol w="571750"/>
+                <a:gridCol w="595006"/>
+                <a:gridCol w="375405"/>
+                <a:gridCol w="360083"/>
+              </a:tblGrid>
+              <a:tr h="266700">
+                <a:tc>
+                  <a:txBody>
+                    <a:bodyPr/>
+                    <a:lstStyle/>
+                    <a:p>
+                      <a:pPr algn="ctr"/>
+                      <a:r>
+                        <a:rPr lang="en-US" sz="1200" b="1" dirty="0" smtClean="0"/>
+                        <a:t>A0</a:t>
+                      </a:r>
+                      <a:endParaRPr lang="en-US" sz="1200" b="1" dirty="0"/>
+                    </a:p>
+                  </a:txBody>
+                  <a:tcPr/>
+                </a:tc>
+                <a:tc>
+                  <a:txBody>
+                    <a:bodyPr/>
+                    <a:lstStyle/>
+                    <a:p>
+                      <a:pPr algn="ctr"/>
+                      <a:r>
+                        <a:rPr lang="en-US" sz="1200" b="1" dirty="0" smtClean="0"/>
+                        <a:t>A1</a:t>
+                      </a:r>
+                      <a:endParaRPr lang="en-US" sz="1200" b="1" dirty="0"/>
+                    </a:p>
+                  </a:txBody>
+                  <a:tcPr/>
+                </a:tc>
+                <a:tc gridSpan="2">
+                  <a:txBody>
+                    <a:bodyPr/>
+                    <a:lstStyle/>
+                    <a:p>
+                      <a:pPr algn="ctr"/>
+                      <a:r>
+                        <a:rPr lang="en-US" sz="1200" b="1" i="1" dirty="0" smtClean="0"/>
+                        <a:t>Default</a:t>
+                      </a:r>
+                      <a:endParaRPr lang="en-US" sz="1100" b="1" i="1" dirty="0"/>
+                    </a:p>
+                  </a:txBody>
+                  <a:tcPr anchor="ctr"/>
+                </a:tc>
+                <a:tc hMerge="1">
+                  <a:txBody>
+                    <a:bodyPr/>
+                    <a:lstStyle/>
+                    <a:p>
+                      <a:endParaRPr lang="en-US" dirty="0"/>
+                    </a:p>
+                  </a:txBody>
+                  <a:tcPr anchor="ctr"/>
+                </a:tc>
+              </a:tr>
+              <a:tr h="121615">
+                <a:tc>
+                  <a:txBody>
+                    <a:bodyPr/>
+                    <a:lstStyle/>
+                    <a:p>
+                      <a:pPr algn="ctr"/>
+                      <a:r>
+                        <a:rPr lang="en-US" sz="1100" dirty="0" smtClean="0"/>
+                        <a:t>S/D</a:t>
+                      </a:r>
+                      <a:endParaRPr lang="en-US" sz="1100" dirty="0"/>
+                    </a:p>
+                  </a:txBody>
+                  <a:tcPr/>
+                </a:tc>
+                <a:tc>
+                  <a:txBody>
+                    <a:bodyPr/>
+                    <a:lstStyle/>
+                    <a:p>
+                      <a:pPr algn="ctr"/>
+                      <a:r>
+                        <a:rPr lang="en-US" sz="1100" dirty="0" smtClean="0"/>
+                        <a:t>O/R</a:t>
+                      </a:r>
+                      <a:endParaRPr lang="en-US" sz="1100" dirty="0"/>
+                    </a:p>
+                  </a:txBody>
+                  <a:tcPr/>
+                </a:tc>
+                <a:tc>
+                  <a:txBody>
+                    <a:bodyPr/>
+                    <a:lstStyle/>
+                    <a:p>
+                      <a:pPr algn="ctr"/>
+                      <a:r>
+                        <a:rPr lang="en-US" sz="1200" b="1" dirty="0" smtClean="0"/>
+                        <a:t>D0</a:t>
+                      </a:r>
+                      <a:endParaRPr lang="en-US" sz="1200" b="1" dirty="0"/>
+                    </a:p>
+                  </a:txBody>
+                  <a:tcPr anchor="ctr"/>
+                </a:tc>
+                <a:tc>
+                  <a:txBody>
+                    <a:bodyPr/>
+                    <a:lstStyle/>
+                    <a:p>
+                      <a:pPr algn="ctr"/>
+                      <a:r>
+                        <a:rPr lang="en-US" sz="1200" b="1" dirty="0" smtClean="0"/>
+                        <a:t>D1</a:t>
+                      </a:r>
+                      <a:endParaRPr lang="en-US" sz="1200" b="1" dirty="0"/>
+                    </a:p>
+                  </a:txBody>
+                  <a:tcPr anchor="ctr"/>
+                </a:tc>
+              </a:tr>
+              <a:tr h="121615">
+                <a:tc>
+                  <a:txBody>
+                    <a:bodyPr/>
+                    <a:lstStyle/>
+                    <a:p>
+                      <a:pPr algn="ctr"/>
+                      <a:r>
+                        <a:rPr lang="en-US" sz="1200" b="1" dirty="0" smtClean="0"/>
+                        <a:t>A2</a:t>
+                      </a:r>
+                      <a:endParaRPr lang="en-US" sz="1200" b="1" dirty="0"/>
+                    </a:p>
+                  </a:txBody>
+                  <a:tcPr/>
+                </a:tc>
+                <a:tc>
+                  <a:txBody>
+                    <a:bodyPr/>
+                    <a:lstStyle/>
+                    <a:p>
+                      <a:pPr algn="ctr"/>
+                      <a:r>
+                        <a:rPr lang="en-US" sz="1200" b="1" dirty="0" smtClean="0"/>
+                        <a:t>A3</a:t>
+                      </a:r>
+                      <a:endParaRPr lang="en-US" sz="1200" b="1" dirty="0"/>
+                    </a:p>
+                  </a:txBody>
+                  <a:tcPr/>
+                </a:tc>
+                <a:tc rowSpan="2">
+                  <a:txBody>
+                    <a:bodyPr/>
+                    <a:lstStyle/>
+                    <a:p>
+                      <a:pPr algn="ctr"/>
+                      <a:r>
+                        <a:rPr lang="en-US" sz="2000" dirty="0" smtClean="0"/>
+                        <a:t>*</a:t>
+                      </a:r>
+                    </a:p>
+                  </a:txBody>
+                  <a:tcPr anchor="ctr"/>
+                </a:tc>
+                <a:tc rowSpan="2">
+                  <a:txBody>
+                    <a:bodyPr/>
+                    <a:lstStyle/>
+                    <a:p>
+                      <a:pPr algn="ctr"/>
+                      <a:endParaRPr lang="en-US" sz="1200" dirty="0"/>
+                    </a:p>
+                  </a:txBody>
+                  <a:tcPr anchor="ctr"/>
+                </a:tc>
+              </a:tr>
+              <a:tr h="170261">
+                <a:tc>
+                  <a:txBody>
+                    <a:bodyPr/>
+                    <a:lstStyle/>
+                    <a:p>
+                      <a:pPr algn="ctr"/>
+                      <a:r>
+                        <a:rPr lang="en-US" sz="1100" dirty="0" smtClean="0"/>
+                        <a:t>Mode</a:t>
+                      </a:r>
+                      <a:endParaRPr lang="en-US" sz="1100" dirty="0"/>
+                    </a:p>
+                  </a:txBody>
+                  <a:tcPr/>
+                </a:tc>
+                <a:tc>
+                  <a:txBody>
+                    <a:bodyPr/>
+                    <a:lstStyle/>
+                    <a:p>
+                      <a:pPr algn="ctr"/>
+                      <a:r>
+                        <a:rPr lang="en-US" sz="1100" dirty="0" smtClean="0"/>
+                        <a:t>Scale</a:t>
+                      </a:r>
+                      <a:endParaRPr lang="en-US" sz="1100" dirty="0"/>
+                    </a:p>
+                  </a:txBody>
+                  <a:tcPr/>
+                </a:tc>
+                <a:tc vMerge="1">
+                  <a:txBody>
+                    <a:bodyPr/>
+                    <a:lstStyle/>
+                    <a:p>
+                      <a:endParaRPr lang="en-US" sz="1400" dirty="0"/>
+                    </a:p>
+                  </a:txBody>
+                  <a:tcPr/>
+                </a:tc>
+                <a:tc vMerge="1">
+                  <a:txBody>
+                    <a:bodyPr/>
+                    <a:lstStyle/>
+                    <a:p>
+                      <a:endParaRPr lang="en-US" sz="1400" dirty="0"/>
+                    </a:p>
+                  </a:txBody>
+                  <a:tcPr/>
+                </a:tc>
+              </a:tr>
+            </a:tbl>
+          </a:graphicData>
+        </a:graphic>
+      </p:graphicFrame>
+      <p:graphicFrame>
+        <p:nvGraphicFramePr>
+          <p:cNvPr id="21" name="Table 20"/>
+          <p:cNvGraphicFramePr>
+            <a:graphicFrameLocks noGrp="1"/>
+          </p:cNvGraphicFramePr>
+          <p:nvPr>
+            <p:extLst>
+              <p:ext uri="{D42A27DB-BD31-4B8C-83A1-F6EECF244321}">
+                <p14:modId xmlns:p14="http://schemas.microsoft.com/office/powerpoint/2010/main" val="3764203593"/>
+              </p:ext>
+            </p:extLst>
+          </p:nvPr>
+        </p:nvGraphicFramePr>
+        <p:xfrm>
+          <a:off x="3833352" y="3944000"/>
+          <a:ext cx="5888839" cy="304799"/>
+        </p:xfrm>
+        <a:graphic>
+          <a:graphicData uri="http://schemas.openxmlformats.org/drawingml/2006/table">
+            <a:tbl>
+              <a:tblPr firstRow="1">
+                <a:tableStyleId>{3C2FFA5D-87B4-456A-9821-1D502468CF0F}</a:tableStyleId>
+              </a:tblPr>
+              <a:tblGrid>
+                <a:gridCol w="5888839"/>
+              </a:tblGrid>
+              <a:tr h="195897">
+                <a:tc>
+                  <a:txBody>
+                    <a:bodyPr/>
+                    <a:lstStyle/>
+                    <a:p>
+                      <a:pPr algn="ctr"/>
+                      <a:r>
+                        <a:rPr lang="en-US" sz="1400" dirty="0" smtClean="0"/>
+                        <a:t>Layouts</a:t>
+                      </a:r>
+                      <a:endParaRPr lang="en-US" sz="1400" dirty="0"/>
+                    </a:p>
+                  </a:txBody>
+                  <a:tcPr/>
+                </a:tc>
+              </a:tr>
+            </a:tbl>
+          </a:graphicData>
+        </a:graphic>
+      </p:graphicFrame>
+      <p:graphicFrame>
+        <p:nvGraphicFramePr>
+          <p:cNvPr id="22" name="Table 21"/>
+          <p:cNvGraphicFramePr>
+            <a:graphicFrameLocks noGrp="1"/>
+          </p:cNvGraphicFramePr>
+          <p:nvPr>
+            <p:extLst>
+              <p:ext uri="{D42A27DB-BD31-4B8C-83A1-F6EECF244321}">
+                <p14:modId xmlns:p14="http://schemas.microsoft.com/office/powerpoint/2010/main" val="833417611"/>
+              </p:ext>
+            </p:extLst>
+          </p:nvPr>
+        </p:nvGraphicFramePr>
+        <p:xfrm>
+          <a:off x="3833352" y="2675595"/>
+          <a:ext cx="2670481" cy="1104900"/>
+        </p:xfrm>
+        <a:graphic>
+          <a:graphicData uri="http://schemas.openxmlformats.org/drawingml/2006/table">
+            <a:tbl>
+              <a:tblPr firstRow="1">
+                <a:tableStyleId>{3C2FFA5D-87B4-456A-9821-1D502468CF0F}</a:tableStyleId>
+              </a:tblPr>
+              <a:tblGrid>
+                <a:gridCol w="524500"/>
+                <a:gridCol w="2145981"/>
+              </a:tblGrid>
+              <a:tr h="163376">
+                <a:tc gridSpan="2">
+                  <a:txBody>
+                    <a:bodyPr/>
+                    <a:lstStyle/>
+                    <a:p>
+                      <a:pPr algn="ctr"/>
+                      <a:r>
+                        <a:rPr lang="en-US" sz="1050" dirty="0" smtClean="0"/>
+                        <a:t>O / R Control Selection</a:t>
+                      </a:r>
+                      <a:endParaRPr lang="en-US" sz="1050" dirty="0"/>
+                    </a:p>
+                  </a:txBody>
+                  <a:tcPr/>
+                </a:tc>
+                <a:tc hMerge="1">
+                  <a:txBody>
+                    <a:bodyPr/>
+                    <a:lstStyle/>
+                    <a:p>
+                      <a:endParaRPr lang="en-US" sz="1400" dirty="0"/>
+                    </a:p>
+                  </a:txBody>
+                  <a:tcPr/>
+                </a:tc>
+              </a:tr>
+              <a:tr h="181529">
+                <a:tc>
+                  <a:txBody>
+                    <a:bodyPr/>
+                    <a:lstStyle/>
+                    <a:p>
+                      <a:pPr algn="ctr"/>
+                      <a:r>
+                        <a:rPr lang="en-US" sz="1100" b="1" dirty="0" smtClean="0"/>
+                        <a:t>*</a:t>
+                      </a:r>
+                      <a:endParaRPr lang="en-US" sz="1100" b="1" dirty="0"/>
+                    </a:p>
+                  </a:txBody>
+                  <a:tcPr anchor="ctr"/>
+                </a:tc>
+                <a:tc>
+                  <a:txBody>
+                    <a:bodyPr/>
+                    <a:lstStyle/>
+                    <a:p>
+                      <a:r>
+                        <a:rPr lang="en-US" sz="800" dirty="0" smtClean="0"/>
+                        <a:t>O/R control sets number of </a:t>
+                      </a:r>
+                      <a:r>
+                        <a:rPr lang="en-US" sz="800" i="1" dirty="0" smtClean="0"/>
+                        <a:t>octaves</a:t>
+                      </a:r>
+                      <a:r>
+                        <a:rPr lang="en-US" sz="800" dirty="0" smtClean="0"/>
+                        <a:t>.</a:t>
+                      </a:r>
+                      <a:endParaRPr lang="en-US" sz="800" dirty="0"/>
+                    </a:p>
+                  </a:txBody>
+                  <a:tcPr anchor="ctr"/>
+                </a:tc>
+              </a:tr>
+              <a:tr h="181529">
+                <a:tc>
+                  <a:txBody>
+                    <a:bodyPr/>
+                    <a:lstStyle/>
+                    <a:p>
+                      <a:pPr algn="ctr"/>
+                      <a:r>
+                        <a:rPr lang="en-US" sz="1100" b="1" dirty="0" smtClean="0"/>
+                        <a:t>**</a:t>
+                      </a:r>
+                      <a:endParaRPr lang="en-US" sz="1100" b="1" dirty="0"/>
+                    </a:p>
+                  </a:txBody>
+                  <a:tcPr anchor="ctr"/>
+                </a:tc>
+                <a:tc>
+                  <a:txBody>
+                    <a:bodyPr/>
+                    <a:lstStyle/>
+                    <a:p>
+                      <a:r>
+                        <a:rPr lang="en-US" sz="800" dirty="0" smtClean="0"/>
+                        <a:t>O/R</a:t>
+                      </a:r>
+                      <a:r>
+                        <a:rPr lang="en-US" sz="800" baseline="0" dirty="0" smtClean="0"/>
+                        <a:t> control sets </a:t>
+                      </a:r>
+                      <a:r>
+                        <a:rPr lang="en-US" sz="800" i="1" baseline="0" dirty="0" smtClean="0"/>
+                        <a:t>root note </a:t>
+                      </a:r>
+                      <a:r>
+                        <a:rPr lang="en-US" sz="800" baseline="0" dirty="0" smtClean="0"/>
+                        <a:t>of </a:t>
+                      </a:r>
+                      <a:r>
+                        <a:rPr lang="en-US" sz="800" baseline="0" dirty="0" err="1" smtClean="0"/>
+                        <a:t>apreggio</a:t>
+                      </a:r>
+                      <a:r>
+                        <a:rPr lang="en-US" sz="800" baseline="0" dirty="0" smtClean="0"/>
+                        <a:t>.</a:t>
+                      </a:r>
+                      <a:endParaRPr lang="en-US" sz="800" dirty="0"/>
+                    </a:p>
+                  </a:txBody>
+                  <a:tcPr anchor="ctr"/>
+                </a:tc>
+              </a:tr>
+              <a:tr h="299523">
+                <a:tc>
+                  <a:txBody>
+                    <a:bodyPr/>
+                    <a:lstStyle/>
+                    <a:p>
+                      <a:pPr algn="ctr"/>
+                      <a:r>
+                        <a:rPr lang="en-US" sz="1100" b="1" dirty="0" smtClean="0"/>
+                        <a:t>***</a:t>
+                      </a:r>
+                      <a:endParaRPr lang="en-US" sz="1100" b="1" dirty="0"/>
+                    </a:p>
+                  </a:txBody>
+                  <a:tcPr anchor="ctr"/>
+                </a:tc>
+                <a:tc>
+                  <a:txBody>
+                    <a:bodyPr/>
+                    <a:lstStyle/>
+                    <a:p>
+                      <a:r>
+                        <a:rPr lang="en-GB" sz="800" dirty="0" smtClean="0"/>
+                        <a:t>O/R control manages </a:t>
+                      </a:r>
+                      <a:r>
+                        <a:rPr lang="en-GB" sz="800" i="1" dirty="0" smtClean="0"/>
+                        <a:t>both</a:t>
+                      </a:r>
+                      <a:r>
+                        <a:rPr lang="en-GB" sz="800" dirty="0" smtClean="0"/>
+                        <a:t> root note (front of range), and number of octaves (back of range).</a:t>
+                      </a:r>
+                      <a:endParaRPr lang="en-US" sz="800" dirty="0"/>
+                    </a:p>
+                  </a:txBody>
+                  <a:tcPr anchor="ctr"/>
+                </a:tc>
+              </a:tr>
+            </a:tbl>
+          </a:graphicData>
+        </a:graphic>
+      </p:graphicFrame>
+      <p:sp>
+        <p:nvSpPr>
+          <p:cNvPr id="23" name="TextBox 22"/>
+          <p:cNvSpPr txBox="1"/>
+          <p:nvPr/>
+        </p:nvSpPr>
+        <p:spPr>
+          <a:xfrm>
+            <a:off x="3833352" y="544260"/>
+            <a:ext cx="2775331" cy="1996479"/>
+          </a:xfrm>
+          <a:prstGeom prst="rect">
+            <a:avLst/>
+          </a:prstGeom>
+          <a:noFill/>
+        </p:spPr>
+        <p:txBody>
+          <a:bodyPr wrap="square" lIns="0" rIns="0" bIns="0" rtlCol="0">
+            <a:noAutofit/>
+          </a:bodyPr>
+          <a:lstStyle/>
+          <a:p>
+            <a:r>
+              <a:rPr lang="en-US" sz="800" b="1" dirty="0" smtClean="0"/>
+              <a:t>Parameters</a:t>
+            </a:r>
+            <a:endParaRPr lang="en-US" sz="800" dirty="0"/>
+          </a:p>
+          <a:p>
+            <a:pPr marL="171450" indent="-171450">
+              <a:buFont typeface="Arial"/>
+              <a:buChar char="•"/>
+            </a:pPr>
+            <a:r>
+              <a:rPr lang="en-US" sz="800" dirty="0" smtClean="0"/>
+              <a:t>Scale of the arpeggio</a:t>
+            </a:r>
+          </a:p>
+          <a:p>
+            <a:pPr marL="171450" indent="-171450">
+              <a:buFont typeface="Arial"/>
+              <a:buChar char="•"/>
+            </a:pPr>
+            <a:r>
+              <a:rPr lang="en-US" sz="800" dirty="0" smtClean="0"/>
+              <a:t>Root note of the arpeggio in the selected scale</a:t>
+            </a:r>
+          </a:p>
+          <a:p>
+            <a:pPr marL="171450" indent="-171450">
+              <a:buFont typeface="Arial"/>
+              <a:buChar char="•"/>
+            </a:pPr>
+            <a:r>
+              <a:rPr lang="en-US" sz="800" dirty="0" smtClean="0"/>
+              <a:t>Distance in scale notes between each arpeggio step</a:t>
+            </a:r>
+          </a:p>
+          <a:p>
+            <a:pPr marL="171450" indent="-171450">
+              <a:buFont typeface="Arial"/>
+              <a:buChar char="•"/>
+            </a:pPr>
+            <a:r>
+              <a:rPr lang="en-US" sz="800" dirty="0" smtClean="0"/>
+              <a:t>Number of steps in the arpeggio</a:t>
+            </a:r>
+          </a:p>
+          <a:p>
+            <a:pPr marL="171450" indent="-171450">
+              <a:buFont typeface="Arial"/>
+              <a:buChar char="•"/>
+            </a:pPr>
+            <a:r>
+              <a:rPr lang="en-US" sz="800" dirty="0" smtClean="0"/>
+              <a:t>Mode of playback of the arpeggio</a:t>
+            </a:r>
+          </a:p>
+          <a:p>
+            <a:pPr marL="171450" indent="-171450">
+              <a:buFont typeface="Arial"/>
+              <a:buChar char="•"/>
+            </a:pPr>
+            <a:r>
+              <a:rPr lang="en-US" sz="800" dirty="0" smtClean="0"/>
+              <a:t>Number of octaves the </a:t>
+            </a:r>
+            <a:r>
+              <a:rPr lang="en-US" sz="800" dirty="0" err="1" smtClean="0"/>
+              <a:t>apreggio</a:t>
+            </a:r>
+            <a:r>
+              <a:rPr lang="en-US" sz="800" dirty="0" smtClean="0"/>
+              <a:t> is repeated over</a:t>
+            </a:r>
+          </a:p>
+          <a:p>
+            <a:endParaRPr lang="en-US" sz="800" dirty="0"/>
+          </a:p>
+          <a:p>
+            <a:r>
+              <a:rPr lang="en-US" sz="800" dirty="0" smtClean="0"/>
+              <a:t>The </a:t>
+            </a:r>
+            <a:r>
+              <a:rPr lang="en-US" sz="800" dirty="0" err="1" smtClean="0"/>
+              <a:t>arpeggiator</a:t>
+            </a:r>
+            <a:r>
+              <a:rPr lang="en-US" sz="800" dirty="0" smtClean="0"/>
+              <a:t> will play up to 5 octaves of notes. If an </a:t>
+            </a:r>
+            <a:r>
+              <a:rPr lang="en-US" sz="800" dirty="0" err="1" smtClean="0"/>
+              <a:t>apreggio</a:t>
+            </a:r>
+            <a:r>
+              <a:rPr lang="en-US" sz="800" dirty="0"/>
+              <a:t> </a:t>
+            </a:r>
+            <a:r>
+              <a:rPr lang="en-US" sz="800" dirty="0" smtClean="0"/>
+              <a:t>tries to play above this, we drop the remainder of it 5 octaves, then continue to play from there, preserving arpeggio length.</a:t>
+            </a:r>
+          </a:p>
+          <a:p>
+            <a:endParaRPr lang="en-US" sz="800" b="1" u="sng" dirty="0"/>
+          </a:p>
+          <a:p>
+            <a:r>
+              <a:rPr lang="en-US" sz="800" b="1" dirty="0" smtClean="0"/>
+              <a:t>Outputs</a:t>
+            </a:r>
+            <a:endParaRPr lang="en-US" sz="800" b="1" u="sng" dirty="0"/>
+          </a:p>
+          <a:p>
+            <a:r>
+              <a:rPr lang="en-US" sz="800" dirty="0"/>
+              <a:t>DAC output gives the 1V/Oct output to send to your oscillator.</a:t>
+            </a:r>
+          </a:p>
+          <a:p>
+            <a:r>
+              <a:rPr lang="en-US" sz="800" dirty="0"/>
+              <a:t>D0 triggers every time the entire arpeggio sequence starts </a:t>
+            </a:r>
+            <a:r>
+              <a:rPr lang="en-US" sz="800" dirty="0" smtClean="0"/>
+              <a:t>again.</a:t>
+            </a:r>
+            <a:endParaRPr lang="en-US" sz="800" dirty="0"/>
+          </a:p>
+          <a:p>
+            <a:r>
+              <a:rPr lang="en-US" sz="800" dirty="0"/>
+              <a:t>D1 triggers every time the arpeggio changes octave</a:t>
+            </a:r>
+            <a:r>
+              <a:rPr lang="en-US" sz="800" dirty="0" smtClean="0"/>
+              <a:t>.</a:t>
+            </a:r>
           </a:p>
         </p:txBody>
       </p:sp>
@@ -5769,6 +6165,13 @@
   <p:clrMapOvr>
     <a:masterClrMapping/>
   </p:clrMapOvr>
+  <p:timing>
+    <p:tnLst>
+      <p:par>
+        <p:cTn xmlns:p14="http://schemas.microsoft.com/office/powerpoint/2010/main" id="1" dur="indefinite" restart="never" nodeType="tmRoot"/>
+      </p:par>
+    </p:tnLst>
+  </p:timing>
 </p:sld>
 </file>
 

</xml_diff>